<commit_message>
Edit BoardDao 오류 처리 by try-catch
</commit_message>
<xml_diff>
--- a/study-note/자바/2022-08-06 내용정리.pptx
+++ b/study-note/자바/2022-08-06 내용정리.pptx
@@ -5,15 +5,12 @@
     <p:sldMasterId id="2147483648" r:id="rId1"/>
   </p:sldMasterIdLst>
   <p:notesMasterIdLst>
-    <p:notesMasterId r:id="rId8"/>
+    <p:notesMasterId r:id="rId5"/>
   </p:notesMasterIdLst>
   <p:sldIdLst>
     <p:sldId id="256" r:id="rId2"/>
-    <p:sldId id="277" r:id="rId3"/>
-    <p:sldId id="278" r:id="rId4"/>
-    <p:sldId id="279" r:id="rId5"/>
-    <p:sldId id="280" r:id="rId6"/>
-    <p:sldId id="281" r:id="rId7"/>
+    <p:sldId id="280" r:id="rId3"/>
+    <p:sldId id="281" r:id="rId4"/>
   </p:sldIdLst>
   <p:sldSz cx="12192000" cy="6858000"/>
   <p:notesSz cx="6858000" cy="9144000"/>
@@ -3773,999 +3770,26 @@
           <a:chExt cx="0" cy="0"/>
         </a:xfrm>
       </p:grpSpPr>
-      <p:sp>
-        <p:nvSpPr>
-          <p:cNvPr id="4" name="직사각형 3">
-            <a:extLst>
-              <a:ext uri="{FF2B5EF4-FFF2-40B4-BE49-F238E27FC236}">
-                <a16:creationId xmlns:a16="http://schemas.microsoft.com/office/drawing/2014/main" id="{92D1EBF9-BF79-C348-542E-7867D7EFD64A}"/>
-              </a:ext>
-            </a:extLst>
-          </p:cNvPr>
-          <p:cNvSpPr/>
-          <p:nvPr/>
-        </p:nvSpPr>
-        <p:spPr>
-          <a:xfrm>
-            <a:off x="1051033" y="804042"/>
-            <a:ext cx="1828801" cy="677917"/>
-          </a:xfrm>
-          <a:prstGeom prst="rect">
-            <a:avLst/>
-          </a:prstGeom>
-        </p:spPr>
-        <p:style>
-          <a:lnRef idx="2">
-            <a:schemeClr val="accent1">
-              <a:shade val="50000"/>
-            </a:schemeClr>
-          </a:lnRef>
-          <a:fillRef idx="1">
-            <a:schemeClr val="accent1"/>
-          </a:fillRef>
-          <a:effectRef idx="0">
-            <a:schemeClr val="accent1"/>
-          </a:effectRef>
-          <a:fontRef idx="minor">
-            <a:schemeClr val="lt1"/>
-          </a:fontRef>
-        </p:style>
-        <p:txBody>
-          <a:bodyPr rtlCol="0" anchor="ctr"/>
-          <a:lstStyle/>
-          <a:p>
-            <a:pPr algn="ctr"/>
-            <a:r>
-              <a:rPr kumimoji="1" lang="en-US" altLang="ko-Kore-KR" dirty="0" err="1"/>
-              <a:t>ArrayList</a:t>
-            </a:r>
-            <a:endParaRPr kumimoji="1" lang="ko-Kore-KR" altLang="en-US" dirty="0"/>
-          </a:p>
-        </p:txBody>
-      </p:sp>
-      <p:sp>
-        <p:nvSpPr>
-          <p:cNvPr id="7" name="직사각형 6">
-            <a:extLst>
-              <a:ext uri="{FF2B5EF4-FFF2-40B4-BE49-F238E27FC236}">
-                <a16:creationId xmlns:a16="http://schemas.microsoft.com/office/drawing/2014/main" id="{FE0F70A9-B948-5105-6F83-EF9C136BC26D}"/>
-              </a:ext>
-            </a:extLst>
-          </p:cNvPr>
-          <p:cNvSpPr/>
-          <p:nvPr/>
-        </p:nvSpPr>
-        <p:spPr>
-          <a:xfrm>
-            <a:off x="1051032" y="1839311"/>
-            <a:ext cx="1828801" cy="677917"/>
-          </a:xfrm>
-          <a:prstGeom prst="rect">
-            <a:avLst/>
-          </a:prstGeom>
-        </p:spPr>
-        <p:style>
-          <a:lnRef idx="2">
-            <a:schemeClr val="accent1">
-              <a:shade val="50000"/>
-            </a:schemeClr>
-          </a:lnRef>
-          <a:fillRef idx="1">
-            <a:schemeClr val="accent1"/>
-          </a:fillRef>
-          <a:effectRef idx="0">
-            <a:schemeClr val="accent1"/>
-          </a:effectRef>
-          <a:fontRef idx="minor">
-            <a:schemeClr val="lt1"/>
-          </a:fontRef>
-        </p:style>
-        <p:txBody>
-          <a:bodyPr rtlCol="0" anchor="ctr"/>
-          <a:lstStyle/>
-          <a:p>
-            <a:pPr algn="ctr"/>
-            <a:r>
-              <a:rPr kumimoji="1" lang="en-US" altLang="ko-Kore-KR" dirty="0"/>
-              <a:t>LinkedList</a:t>
-            </a:r>
-            <a:endParaRPr kumimoji="1" lang="ko-Kore-KR" altLang="en-US" dirty="0"/>
-          </a:p>
-        </p:txBody>
-      </p:sp>
-      <p:sp>
-        <p:nvSpPr>
-          <p:cNvPr id="8" name="직사각형 7">
-            <a:extLst>
-              <a:ext uri="{FF2B5EF4-FFF2-40B4-BE49-F238E27FC236}">
-                <a16:creationId xmlns:a16="http://schemas.microsoft.com/office/drawing/2014/main" id="{40FFE58C-54FD-E225-41DA-D6A8FEFDFD88}"/>
-              </a:ext>
-            </a:extLst>
-          </p:cNvPr>
-          <p:cNvSpPr/>
-          <p:nvPr/>
-        </p:nvSpPr>
-        <p:spPr>
-          <a:xfrm>
-            <a:off x="1051031" y="2920562"/>
-            <a:ext cx="1828801" cy="677917"/>
-          </a:xfrm>
-          <a:prstGeom prst="rect">
-            <a:avLst/>
-          </a:prstGeom>
-        </p:spPr>
-        <p:style>
-          <a:lnRef idx="2">
-            <a:schemeClr val="accent1">
-              <a:shade val="50000"/>
-            </a:schemeClr>
-          </a:lnRef>
-          <a:fillRef idx="1">
-            <a:schemeClr val="accent1"/>
-          </a:fillRef>
-          <a:effectRef idx="0">
-            <a:schemeClr val="accent1"/>
-          </a:effectRef>
-          <a:fontRef idx="minor">
-            <a:schemeClr val="lt1"/>
-          </a:fontRef>
-        </p:style>
-        <p:txBody>
-          <a:bodyPr rtlCol="0" anchor="ctr"/>
-          <a:lstStyle/>
-          <a:p>
-            <a:pPr algn="ctr"/>
-            <a:r>
-              <a:rPr kumimoji="1" lang="en-US" altLang="ko-Kore-KR" dirty="0"/>
-              <a:t>Stack</a:t>
-            </a:r>
-            <a:endParaRPr kumimoji="1" lang="ko-Kore-KR" altLang="en-US" dirty="0"/>
-          </a:p>
-        </p:txBody>
-      </p:sp>
-      <p:sp>
-        <p:nvSpPr>
-          <p:cNvPr id="9" name="직사각형 8">
-            <a:extLst>
-              <a:ext uri="{FF2B5EF4-FFF2-40B4-BE49-F238E27FC236}">
-                <a16:creationId xmlns:a16="http://schemas.microsoft.com/office/drawing/2014/main" id="{7E4B8974-D4EB-E905-0ED3-2D2DDC9365F0}"/>
-              </a:ext>
-            </a:extLst>
-          </p:cNvPr>
-          <p:cNvSpPr/>
-          <p:nvPr/>
-        </p:nvSpPr>
-        <p:spPr>
-          <a:xfrm>
-            <a:off x="1051031" y="3955831"/>
-            <a:ext cx="1828801" cy="677917"/>
-          </a:xfrm>
-          <a:prstGeom prst="rect">
-            <a:avLst/>
-          </a:prstGeom>
-        </p:spPr>
-        <p:style>
-          <a:lnRef idx="2">
-            <a:schemeClr val="accent1">
-              <a:shade val="50000"/>
-            </a:schemeClr>
-          </a:lnRef>
-          <a:fillRef idx="1">
-            <a:schemeClr val="accent1"/>
-          </a:fillRef>
-          <a:effectRef idx="0">
-            <a:schemeClr val="accent1"/>
-          </a:effectRef>
-          <a:fontRef idx="minor">
-            <a:schemeClr val="lt1"/>
-          </a:fontRef>
-        </p:style>
-        <p:txBody>
-          <a:bodyPr rtlCol="0" anchor="ctr"/>
-          <a:lstStyle/>
-          <a:p>
-            <a:pPr algn="ctr"/>
-            <a:r>
-              <a:rPr kumimoji="1" lang="en-US" altLang="ko-Kore-KR" dirty="0"/>
-              <a:t>Queue</a:t>
-            </a:r>
-            <a:endParaRPr kumimoji="1" lang="ko-Kore-KR" altLang="en-US" dirty="0"/>
-          </a:p>
-        </p:txBody>
-      </p:sp>
-      <p:sp>
-        <p:nvSpPr>
-          <p:cNvPr id="10" name="직사각형 9">
-            <a:extLst>
-              <a:ext uri="{FF2B5EF4-FFF2-40B4-BE49-F238E27FC236}">
-                <a16:creationId xmlns:a16="http://schemas.microsoft.com/office/drawing/2014/main" id="{071F57C6-F048-0718-D255-C12E543ACF94}"/>
-              </a:ext>
-            </a:extLst>
-          </p:cNvPr>
-          <p:cNvSpPr/>
-          <p:nvPr/>
-        </p:nvSpPr>
-        <p:spPr>
-          <a:xfrm>
-            <a:off x="1051031" y="5037082"/>
-            <a:ext cx="1828801" cy="677917"/>
-          </a:xfrm>
-          <a:prstGeom prst="rect">
-            <a:avLst/>
-          </a:prstGeom>
-        </p:spPr>
-        <p:style>
-          <a:lnRef idx="2">
-            <a:schemeClr val="accent1">
-              <a:shade val="50000"/>
-            </a:schemeClr>
-          </a:lnRef>
-          <a:fillRef idx="1">
-            <a:schemeClr val="accent1"/>
-          </a:fillRef>
-          <a:effectRef idx="0">
-            <a:schemeClr val="accent1"/>
-          </a:effectRef>
-          <a:fontRef idx="minor">
-            <a:schemeClr val="lt1"/>
-          </a:fontRef>
-        </p:style>
-        <p:txBody>
-          <a:bodyPr rtlCol="0" anchor="ctr"/>
-          <a:lstStyle/>
-          <a:p>
-            <a:pPr algn="ctr"/>
-            <a:r>
-              <a:rPr kumimoji="1" lang="en-US" altLang="ko-Kore-KR" dirty="0"/>
-              <a:t>HashSet</a:t>
-            </a:r>
-            <a:endParaRPr kumimoji="1" lang="ko-Kore-KR" altLang="en-US" dirty="0"/>
-          </a:p>
-        </p:txBody>
-      </p:sp>
-      <p:sp>
-        <p:nvSpPr>
-          <p:cNvPr id="14" name="TextBox 13">
-            <a:extLst>
-              <a:ext uri="{FF2B5EF4-FFF2-40B4-BE49-F238E27FC236}">
-                <a16:creationId xmlns:a16="http://schemas.microsoft.com/office/drawing/2014/main" id="{12424D5B-79B7-CF39-074C-257708FF3616}"/>
-              </a:ext>
-            </a:extLst>
-          </p:cNvPr>
-          <p:cNvSpPr txBox="1"/>
-          <p:nvPr/>
-        </p:nvSpPr>
-        <p:spPr>
-          <a:xfrm>
-            <a:off x="9609083" y="2941638"/>
-            <a:ext cx="1742090" cy="646331"/>
-          </a:xfrm>
-          <a:prstGeom prst="rect">
-            <a:avLst/>
-          </a:prstGeom>
-        </p:spPr>
-        <p:style>
-          <a:lnRef idx="2">
-            <a:schemeClr val="accent1"/>
-          </a:lnRef>
-          <a:fillRef idx="1">
-            <a:schemeClr val="lt1"/>
-          </a:fillRef>
-          <a:effectRef idx="0">
-            <a:schemeClr val="accent1"/>
-          </a:effectRef>
-          <a:fontRef idx="minor">
-            <a:schemeClr val="dk1"/>
-          </a:fontRef>
-        </p:style>
-        <p:txBody>
-          <a:bodyPr wrap="square" rtlCol="0">
-            <a:spAutoFit/>
-          </a:bodyPr>
-          <a:lstStyle/>
-          <a:p>
-            <a:r>
-              <a:rPr kumimoji="1" lang="en-US" altLang="ko-Kore-KR" dirty="0"/>
-              <a:t>if(</a:t>
-            </a:r>
-            <a:r>
-              <a:rPr kumimoji="1" lang="en-US" altLang="ko-Kore-KR" dirty="0" err="1"/>
-              <a:t>hasNext</a:t>
-            </a:r>
-            <a:r>
-              <a:rPr kumimoji="1" lang="en-US" altLang="ko-Kore-KR" dirty="0"/>
-              <a:t>())</a:t>
-            </a:r>
-          </a:p>
-          <a:p>
-            <a:r>
-              <a:rPr kumimoji="1" lang="en-US" altLang="ko-Kore-KR" dirty="0">
-                <a:sym typeface="Wingdings" pitchFamily="2" charset="2"/>
-              </a:rPr>
-              <a:t> next();</a:t>
-            </a:r>
-            <a:endParaRPr kumimoji="1" lang="ko-Kore-KR" altLang="en-US" dirty="0"/>
-          </a:p>
-        </p:txBody>
-      </p:sp>
-      <p:sp>
-        <p:nvSpPr>
-          <p:cNvPr id="18" name="TextBox 17">
-            <a:extLst>
-              <a:ext uri="{FF2B5EF4-FFF2-40B4-BE49-F238E27FC236}">
-                <a16:creationId xmlns:a16="http://schemas.microsoft.com/office/drawing/2014/main" id="{4F232CB8-A83C-2EFF-9850-CE4F847D5AAA}"/>
-              </a:ext>
-            </a:extLst>
-          </p:cNvPr>
-          <p:cNvSpPr txBox="1"/>
-          <p:nvPr/>
-        </p:nvSpPr>
-        <p:spPr>
-          <a:xfrm>
-            <a:off x="4742790" y="2797855"/>
-            <a:ext cx="2706419" cy="923330"/>
-          </a:xfrm>
-          <a:prstGeom prst="rect">
-            <a:avLst/>
-          </a:prstGeom>
-        </p:spPr>
-        <p:style>
-          <a:lnRef idx="2">
-            <a:schemeClr val="accent5">
-              <a:shade val="50000"/>
-            </a:schemeClr>
-          </a:lnRef>
-          <a:fillRef idx="1">
-            <a:schemeClr val="accent5"/>
-          </a:fillRef>
-          <a:effectRef idx="0">
-            <a:schemeClr val="accent5"/>
-          </a:effectRef>
-          <a:fontRef idx="minor">
-            <a:schemeClr val="lt1"/>
-          </a:fontRef>
-        </p:style>
-        <p:txBody>
-          <a:bodyPr wrap="square" rtlCol="0">
-            <a:spAutoFit/>
-          </a:bodyPr>
-          <a:lstStyle/>
-          <a:p>
-            <a:pPr algn="ctr"/>
-            <a:r>
-              <a:rPr kumimoji="1" lang="ko-Kore-KR" altLang="en-US" dirty="0"/>
-              <a:t>데이터조회전문가</a:t>
-            </a:r>
-            <a:endParaRPr kumimoji="1" lang="en-US" altLang="ko-Kore-KR" dirty="0"/>
-          </a:p>
-          <a:p>
-            <a:pPr algn="ctr"/>
-            <a:r>
-              <a:rPr kumimoji="1" lang="en-US" altLang="ko-Kore-KR" dirty="0"/>
-              <a:t>Iterator</a:t>
-            </a:r>
-          </a:p>
-          <a:p>
-            <a:pPr algn="ctr"/>
-            <a:endParaRPr kumimoji="1" lang="ko-Kore-KR" altLang="en-US" dirty="0"/>
-          </a:p>
-        </p:txBody>
-      </p:sp>
       <p:cxnSp>
         <p:nvCxnSpPr>
-          <p:cNvPr id="25" name="직선 화살표 연결선 24">
-            <a:extLst>
-              <a:ext uri="{FF2B5EF4-FFF2-40B4-BE49-F238E27FC236}">
-                <a16:creationId xmlns:a16="http://schemas.microsoft.com/office/drawing/2014/main" id="{62F1336D-E9AB-EBCF-BA83-7950534502BA}"/>
+          <p:cNvPr id="75" name="직선 화살표 연결선 74">
+            <a:extLst>
+              <a:ext uri="{FF2B5EF4-FFF2-40B4-BE49-F238E27FC236}">
+                <a16:creationId xmlns:a16="http://schemas.microsoft.com/office/drawing/2014/main" id="{6D35E7B3-3A74-489D-2B33-6F19BBD938EE}"/>
               </a:ext>
             </a:extLst>
           </p:cNvPr>
           <p:cNvCxnSpPr>
             <a:cxnSpLocks/>
-            <a:stCxn id="14" idx="1"/>
-            <a:endCxn id="18" idx="3"/>
-          </p:cNvCxnSpPr>
-          <p:nvPr/>
-        </p:nvCxnSpPr>
-        <p:spPr>
-          <a:xfrm flipH="1" flipV="1">
-            <a:off x="7449209" y="3259520"/>
-            <a:ext cx="2159874" cy="5284"/>
-          </a:xfrm>
-          <a:prstGeom prst="straightConnector1">
-            <a:avLst/>
-          </a:prstGeom>
-          <a:ln>
-            <a:tailEnd type="triangle"/>
-          </a:ln>
-        </p:spPr>
-        <p:style>
-          <a:lnRef idx="3">
-            <a:schemeClr val="accent1"/>
-          </a:lnRef>
-          <a:fillRef idx="0">
-            <a:schemeClr val="accent1"/>
-          </a:fillRef>
-          <a:effectRef idx="2">
-            <a:schemeClr val="accent1"/>
-          </a:effectRef>
-          <a:fontRef idx="minor">
-            <a:schemeClr val="tx1"/>
-          </a:fontRef>
-        </p:style>
-      </p:cxnSp>
-      <p:cxnSp>
-        <p:nvCxnSpPr>
-          <p:cNvPr id="39" name="직선 화살표 연결선 38">
-            <a:extLst>
-              <a:ext uri="{FF2B5EF4-FFF2-40B4-BE49-F238E27FC236}">
-                <a16:creationId xmlns:a16="http://schemas.microsoft.com/office/drawing/2014/main" id="{5E5096CD-9653-6807-6844-6E1B381D5F49}"/>
-              </a:ext>
-            </a:extLst>
-          </p:cNvPr>
-          <p:cNvCxnSpPr>
-            <a:cxnSpLocks/>
-            <a:stCxn id="4" idx="3"/>
-            <a:endCxn id="18" idx="1"/>
-          </p:cNvCxnSpPr>
-          <p:nvPr/>
-        </p:nvCxnSpPr>
-        <p:spPr>
-          <a:xfrm>
-            <a:off x="2879834" y="1143001"/>
-            <a:ext cx="1862956" cy="2116519"/>
-          </a:xfrm>
-          <a:prstGeom prst="straightConnector1">
-            <a:avLst/>
-          </a:prstGeom>
-          <a:ln>
-            <a:tailEnd type="triangle"/>
-          </a:ln>
-        </p:spPr>
-        <p:style>
-          <a:lnRef idx="3">
-            <a:schemeClr val="accent1"/>
-          </a:lnRef>
-          <a:fillRef idx="0">
-            <a:schemeClr val="accent1"/>
-          </a:fillRef>
-          <a:effectRef idx="2">
-            <a:schemeClr val="accent1"/>
-          </a:effectRef>
-          <a:fontRef idx="minor">
-            <a:schemeClr val="tx1"/>
-          </a:fontRef>
-        </p:style>
-      </p:cxnSp>
-      <p:cxnSp>
-        <p:nvCxnSpPr>
-          <p:cNvPr id="42" name="직선 화살표 연결선 41">
-            <a:extLst>
-              <a:ext uri="{FF2B5EF4-FFF2-40B4-BE49-F238E27FC236}">
-                <a16:creationId xmlns:a16="http://schemas.microsoft.com/office/drawing/2014/main" id="{90F6D2E0-5401-948F-D33B-E53762B575D2}"/>
-              </a:ext>
-            </a:extLst>
-          </p:cNvPr>
-          <p:cNvCxnSpPr>
-            <a:cxnSpLocks/>
-            <a:stCxn id="7" idx="3"/>
-            <a:endCxn id="18" idx="1"/>
-          </p:cNvCxnSpPr>
-          <p:nvPr/>
-        </p:nvCxnSpPr>
-        <p:spPr>
-          <a:xfrm>
-            <a:off x="2879833" y="2178270"/>
-            <a:ext cx="1862957" cy="1081250"/>
-          </a:xfrm>
-          <a:prstGeom prst="straightConnector1">
-            <a:avLst/>
-          </a:prstGeom>
-          <a:ln>
-            <a:tailEnd type="triangle"/>
-          </a:ln>
-        </p:spPr>
-        <p:style>
-          <a:lnRef idx="3">
-            <a:schemeClr val="accent1"/>
-          </a:lnRef>
-          <a:fillRef idx="0">
-            <a:schemeClr val="accent1"/>
-          </a:fillRef>
-          <a:effectRef idx="2">
-            <a:schemeClr val="accent1"/>
-          </a:effectRef>
-          <a:fontRef idx="minor">
-            <a:schemeClr val="tx1"/>
-          </a:fontRef>
-        </p:style>
-      </p:cxnSp>
-      <p:cxnSp>
-        <p:nvCxnSpPr>
-          <p:cNvPr id="45" name="직선 화살표 연결선 44">
-            <a:extLst>
-              <a:ext uri="{FF2B5EF4-FFF2-40B4-BE49-F238E27FC236}">
-                <a16:creationId xmlns:a16="http://schemas.microsoft.com/office/drawing/2014/main" id="{7048F1E5-A227-B9BA-2001-12BA46DBD232}"/>
-              </a:ext>
-            </a:extLst>
-          </p:cNvPr>
-          <p:cNvCxnSpPr>
-            <a:cxnSpLocks/>
-            <a:stCxn id="8" idx="3"/>
-            <a:endCxn id="18" idx="1"/>
+            <a:stCxn id="19" idx="0"/>
+            <a:endCxn id="74" idx="2"/>
           </p:cNvCxnSpPr>
           <p:nvPr/>
         </p:nvCxnSpPr>
         <p:spPr>
           <a:xfrm flipV="1">
-            <a:off x="2879832" y="3259520"/>
-            <a:ext cx="1862958" cy="1"/>
-          </a:xfrm>
-          <a:prstGeom prst="straightConnector1">
-            <a:avLst/>
-          </a:prstGeom>
-          <a:ln>
-            <a:tailEnd type="triangle"/>
-          </a:ln>
-        </p:spPr>
-        <p:style>
-          <a:lnRef idx="3">
-            <a:schemeClr val="accent1"/>
-          </a:lnRef>
-          <a:fillRef idx="0">
-            <a:schemeClr val="accent1"/>
-          </a:fillRef>
-          <a:effectRef idx="2">
-            <a:schemeClr val="accent1"/>
-          </a:effectRef>
-          <a:fontRef idx="minor">
-            <a:schemeClr val="tx1"/>
-          </a:fontRef>
-        </p:style>
-      </p:cxnSp>
-      <p:cxnSp>
-        <p:nvCxnSpPr>
-          <p:cNvPr id="49" name="직선 화살표 연결선 48">
-            <a:extLst>
-              <a:ext uri="{FF2B5EF4-FFF2-40B4-BE49-F238E27FC236}">
-                <a16:creationId xmlns:a16="http://schemas.microsoft.com/office/drawing/2014/main" id="{A5BF1855-8B5C-A3C6-7C1F-E0FFEDB8477D}"/>
-              </a:ext>
-            </a:extLst>
-          </p:cNvPr>
-          <p:cNvCxnSpPr>
-            <a:cxnSpLocks/>
-            <a:stCxn id="9" idx="3"/>
-            <a:endCxn id="18" idx="1"/>
-          </p:cNvCxnSpPr>
-          <p:nvPr/>
-        </p:nvCxnSpPr>
-        <p:spPr>
-          <a:xfrm flipV="1">
-            <a:off x="2879832" y="3259520"/>
-            <a:ext cx="1862958" cy="1035270"/>
-          </a:xfrm>
-          <a:prstGeom prst="straightConnector1">
-            <a:avLst/>
-          </a:prstGeom>
-          <a:ln>
-            <a:tailEnd type="triangle"/>
-          </a:ln>
-        </p:spPr>
-        <p:style>
-          <a:lnRef idx="3">
-            <a:schemeClr val="accent1"/>
-          </a:lnRef>
-          <a:fillRef idx="0">
-            <a:schemeClr val="accent1"/>
-          </a:fillRef>
-          <a:effectRef idx="2">
-            <a:schemeClr val="accent1"/>
-          </a:effectRef>
-          <a:fontRef idx="minor">
-            <a:schemeClr val="tx1"/>
-          </a:fontRef>
-        </p:style>
-      </p:cxnSp>
-      <p:cxnSp>
-        <p:nvCxnSpPr>
-          <p:cNvPr id="52" name="직선 화살표 연결선 51">
-            <a:extLst>
-              <a:ext uri="{FF2B5EF4-FFF2-40B4-BE49-F238E27FC236}">
-                <a16:creationId xmlns:a16="http://schemas.microsoft.com/office/drawing/2014/main" id="{3EE4050A-08E5-8012-FD20-D7EE5F115948}"/>
-              </a:ext>
-            </a:extLst>
-          </p:cNvPr>
-          <p:cNvCxnSpPr>
-            <a:cxnSpLocks/>
-            <a:stCxn id="10" idx="3"/>
-            <a:endCxn id="18" idx="1"/>
-          </p:cNvCxnSpPr>
-          <p:nvPr/>
-        </p:nvCxnSpPr>
-        <p:spPr>
-          <a:xfrm flipV="1">
-            <a:off x="2879832" y="3259520"/>
-            <a:ext cx="1862958" cy="2116521"/>
-          </a:xfrm>
-          <a:prstGeom prst="straightConnector1">
-            <a:avLst/>
-          </a:prstGeom>
-          <a:ln>
-            <a:tailEnd type="triangle"/>
-          </a:ln>
-        </p:spPr>
-        <p:style>
-          <a:lnRef idx="3">
-            <a:schemeClr val="accent1"/>
-          </a:lnRef>
-          <a:fillRef idx="0">
-            <a:schemeClr val="accent1"/>
-          </a:fillRef>
-          <a:effectRef idx="2">
-            <a:schemeClr val="accent1"/>
-          </a:effectRef>
-          <a:fontRef idx="minor">
-            <a:schemeClr val="tx1"/>
-          </a:fontRef>
-        </p:style>
-      </p:cxnSp>
-    </p:spTree>
-    <p:extLst>
-      <p:ext uri="{BB962C8B-B14F-4D97-AF65-F5344CB8AC3E}">
-        <p14:creationId xmlns:p14="http://schemas.microsoft.com/office/powerpoint/2010/main" val="3523101145"/>
-      </p:ext>
-    </p:extLst>
-  </p:cSld>
-  <p:clrMapOvr>
-    <a:masterClrMapping/>
-  </p:clrMapOvr>
-</p:sld>
-</file>
-
-<file path=ppt/slides/slide3.xml><?xml version="1.0" encoding="utf-8"?>
-<p:sld xmlns:a="http://schemas.openxmlformats.org/drawingml/2006/main" xmlns:r="http://schemas.openxmlformats.org/officeDocument/2006/relationships" xmlns:p="http://schemas.openxmlformats.org/presentationml/2006/main">
-  <p:cSld>
-    <p:spTree>
-      <p:nvGrpSpPr>
-        <p:cNvPr id="1" name=""/>
-        <p:cNvGrpSpPr/>
-        <p:nvPr/>
-      </p:nvGrpSpPr>
-      <p:grpSpPr>
-        <a:xfrm>
-          <a:off x="0" y="0"/>
-          <a:ext cx="0" cy="0"/>
-          <a:chOff x="0" y="0"/>
-          <a:chExt cx="0" cy="0"/>
-        </a:xfrm>
-      </p:grpSpPr>
-      <p:sp>
-        <p:nvSpPr>
-          <p:cNvPr id="7" name="직사각형 6">
-            <a:extLst>
-              <a:ext uri="{FF2B5EF4-FFF2-40B4-BE49-F238E27FC236}">
-                <a16:creationId xmlns:a16="http://schemas.microsoft.com/office/drawing/2014/main" id="{FE0F70A9-B948-5105-6F83-EF9C136BC26D}"/>
-              </a:ext>
-            </a:extLst>
-          </p:cNvPr>
-          <p:cNvSpPr/>
-          <p:nvPr/>
-        </p:nvSpPr>
-        <p:spPr>
-          <a:xfrm>
-            <a:off x="919652" y="2910052"/>
-            <a:ext cx="1828801" cy="677917"/>
-          </a:xfrm>
-          <a:prstGeom prst="rect">
-            <a:avLst/>
-          </a:prstGeom>
-        </p:spPr>
-        <p:style>
-          <a:lnRef idx="2">
-            <a:schemeClr val="accent1">
-              <a:shade val="50000"/>
-            </a:schemeClr>
-          </a:lnRef>
-          <a:fillRef idx="1">
-            <a:schemeClr val="accent1"/>
-          </a:fillRef>
-          <a:effectRef idx="0">
-            <a:schemeClr val="accent1"/>
-          </a:effectRef>
-          <a:fontRef idx="minor">
-            <a:schemeClr val="lt1"/>
-          </a:fontRef>
-        </p:style>
-        <p:txBody>
-          <a:bodyPr rtlCol="0" anchor="ctr"/>
-          <a:lstStyle/>
-          <a:p>
-            <a:pPr algn="ctr"/>
-            <a:r>
-              <a:rPr kumimoji="1" lang="en-US" altLang="ko-Kore-KR" dirty="0"/>
-              <a:t>LinkedList</a:t>
-            </a:r>
-            <a:endParaRPr kumimoji="1" lang="ko-Kore-KR" altLang="en-US" dirty="0"/>
-          </a:p>
-        </p:txBody>
-      </p:sp>
-      <p:sp>
-        <p:nvSpPr>
-          <p:cNvPr id="14" name="TextBox 13">
-            <a:extLst>
-              <a:ext uri="{FF2B5EF4-FFF2-40B4-BE49-F238E27FC236}">
-                <a16:creationId xmlns:a16="http://schemas.microsoft.com/office/drawing/2014/main" id="{12424D5B-79B7-CF39-074C-257708FF3616}"/>
-              </a:ext>
-            </a:extLst>
-          </p:cNvPr>
-          <p:cNvSpPr txBox="1"/>
-          <p:nvPr/>
-        </p:nvSpPr>
-        <p:spPr>
-          <a:xfrm>
-            <a:off x="9609083" y="2941638"/>
-            <a:ext cx="1742090" cy="646331"/>
-          </a:xfrm>
-          <a:prstGeom prst="rect">
-            <a:avLst/>
-          </a:prstGeom>
-        </p:spPr>
-        <p:style>
-          <a:lnRef idx="2">
-            <a:schemeClr val="accent1"/>
-          </a:lnRef>
-          <a:fillRef idx="1">
-            <a:schemeClr val="lt1"/>
-          </a:fillRef>
-          <a:effectRef idx="0">
-            <a:schemeClr val="accent1"/>
-          </a:effectRef>
-          <a:fontRef idx="minor">
-            <a:schemeClr val="dk1"/>
-          </a:fontRef>
-        </p:style>
-        <p:txBody>
-          <a:bodyPr wrap="square" rtlCol="0">
-            <a:spAutoFit/>
-          </a:bodyPr>
-          <a:lstStyle/>
-          <a:p>
-            <a:r>
-              <a:rPr kumimoji="1" lang="en-US" altLang="ko-Kore-KR" dirty="0"/>
-              <a:t>if(</a:t>
-            </a:r>
-            <a:r>
-              <a:rPr kumimoji="1" lang="en-US" altLang="ko-Kore-KR" dirty="0" err="1"/>
-              <a:t>hasNext</a:t>
-            </a:r>
-            <a:r>
-              <a:rPr kumimoji="1" lang="en-US" altLang="ko-Kore-KR" dirty="0"/>
-              <a:t>())</a:t>
-            </a:r>
-          </a:p>
-          <a:p>
-            <a:r>
-              <a:rPr kumimoji="1" lang="en-US" altLang="ko-Kore-KR" dirty="0">
-                <a:sym typeface="Wingdings" pitchFamily="2" charset="2"/>
-              </a:rPr>
-              <a:t> next();</a:t>
-            </a:r>
-            <a:endParaRPr kumimoji="1" lang="ko-Kore-KR" altLang="en-US" dirty="0"/>
-          </a:p>
-        </p:txBody>
-      </p:sp>
-      <p:sp>
-        <p:nvSpPr>
-          <p:cNvPr id="18" name="TextBox 17">
-            <a:extLst>
-              <a:ext uri="{FF2B5EF4-FFF2-40B4-BE49-F238E27FC236}">
-                <a16:creationId xmlns:a16="http://schemas.microsoft.com/office/drawing/2014/main" id="{4F232CB8-A83C-2EFF-9850-CE4F847D5AAA}"/>
-              </a:ext>
-            </a:extLst>
-          </p:cNvPr>
-          <p:cNvSpPr txBox="1"/>
-          <p:nvPr/>
-        </p:nvSpPr>
-        <p:spPr>
-          <a:xfrm>
-            <a:off x="4742788" y="3064344"/>
-            <a:ext cx="2706419" cy="369332"/>
-          </a:xfrm>
-          <a:prstGeom prst="rect">
-            <a:avLst/>
-          </a:prstGeom>
-        </p:spPr>
-        <p:style>
-          <a:lnRef idx="2">
-            <a:schemeClr val="accent5">
-              <a:shade val="50000"/>
-            </a:schemeClr>
-          </a:lnRef>
-          <a:fillRef idx="1">
-            <a:schemeClr val="accent5"/>
-          </a:fillRef>
-          <a:effectRef idx="0">
-            <a:schemeClr val="accent5"/>
-          </a:effectRef>
-          <a:fontRef idx="minor">
-            <a:schemeClr val="lt1"/>
-          </a:fontRef>
-        </p:style>
-        <p:txBody>
-          <a:bodyPr wrap="square" rtlCol="0">
-            <a:spAutoFit/>
-          </a:bodyPr>
-          <a:lstStyle/>
-          <a:p>
-            <a:pPr algn="ctr"/>
-            <a:r>
-              <a:rPr kumimoji="1" lang="en-US" altLang="ko-Kore-KR" dirty="0" err="1"/>
-              <a:t>LinkedListIterator</a:t>
-            </a:r>
-            <a:endParaRPr kumimoji="1" lang="en-US" altLang="ko-Kore-KR" dirty="0"/>
-          </a:p>
-        </p:txBody>
-      </p:sp>
-      <p:cxnSp>
-        <p:nvCxnSpPr>
-          <p:cNvPr id="25" name="직선 화살표 연결선 24">
-            <a:extLst>
-              <a:ext uri="{FF2B5EF4-FFF2-40B4-BE49-F238E27FC236}">
-                <a16:creationId xmlns:a16="http://schemas.microsoft.com/office/drawing/2014/main" id="{62F1336D-E9AB-EBCF-BA83-7950534502BA}"/>
-              </a:ext>
-            </a:extLst>
-          </p:cNvPr>
-          <p:cNvCxnSpPr>
-            <a:cxnSpLocks/>
-            <a:stCxn id="14" idx="1"/>
-            <a:endCxn id="18" idx="3"/>
-          </p:cNvCxnSpPr>
-          <p:nvPr/>
-        </p:nvCxnSpPr>
-        <p:spPr>
-          <a:xfrm flipH="1" flipV="1">
-            <a:off x="7449207" y="3249010"/>
-            <a:ext cx="2159876" cy="15794"/>
-          </a:xfrm>
-          <a:prstGeom prst="straightConnector1">
-            <a:avLst/>
-          </a:prstGeom>
-          <a:ln>
-            <a:tailEnd type="triangle"/>
-          </a:ln>
-        </p:spPr>
-        <p:style>
-          <a:lnRef idx="3">
-            <a:schemeClr val="accent1"/>
-          </a:lnRef>
-          <a:fillRef idx="0">
-            <a:schemeClr val="accent1"/>
-          </a:fillRef>
-          <a:effectRef idx="2">
-            <a:schemeClr val="accent1"/>
-          </a:effectRef>
-          <a:fontRef idx="minor">
-            <a:schemeClr val="tx1"/>
-          </a:fontRef>
-        </p:style>
-      </p:cxnSp>
-      <p:cxnSp>
-        <p:nvCxnSpPr>
-          <p:cNvPr id="42" name="직선 화살표 연결선 41">
-            <a:extLst>
-              <a:ext uri="{FF2B5EF4-FFF2-40B4-BE49-F238E27FC236}">
-                <a16:creationId xmlns:a16="http://schemas.microsoft.com/office/drawing/2014/main" id="{90F6D2E0-5401-948F-D33B-E53762B575D2}"/>
-              </a:ext>
-            </a:extLst>
-          </p:cNvPr>
-          <p:cNvCxnSpPr>
-            <a:cxnSpLocks/>
-            <a:stCxn id="7" idx="3"/>
-            <a:endCxn id="18" idx="1"/>
-          </p:cNvCxnSpPr>
-          <p:nvPr/>
-        </p:nvCxnSpPr>
-        <p:spPr>
-          <a:xfrm flipV="1">
-            <a:off x="2748453" y="3249010"/>
-            <a:ext cx="1994335" cy="1"/>
-          </a:xfrm>
-          <a:prstGeom prst="straightConnector1">
-            <a:avLst/>
-          </a:prstGeom>
-          <a:ln>
-            <a:tailEnd type="triangle"/>
-          </a:ln>
-        </p:spPr>
-        <p:style>
-          <a:lnRef idx="3">
-            <a:schemeClr val="accent1"/>
-          </a:lnRef>
-          <a:fillRef idx="0">
-            <a:schemeClr val="accent1"/>
-          </a:fillRef>
-          <a:effectRef idx="2">
-            <a:schemeClr val="accent1"/>
-          </a:effectRef>
-          <a:fontRef idx="minor">
-            <a:schemeClr val="tx1"/>
-          </a:fontRef>
-        </p:style>
-      </p:cxnSp>
-      <p:sp>
-        <p:nvSpPr>
-          <p:cNvPr id="3" name="직사각형 2">
-            <a:extLst>
-              <a:ext uri="{FF2B5EF4-FFF2-40B4-BE49-F238E27FC236}">
-                <a16:creationId xmlns:a16="http://schemas.microsoft.com/office/drawing/2014/main" id="{3E2CAA9F-9834-BA5B-C62A-384357B8EC6D}"/>
-              </a:ext>
-            </a:extLst>
-          </p:cNvPr>
-          <p:cNvSpPr/>
-          <p:nvPr/>
-        </p:nvSpPr>
-        <p:spPr>
-          <a:xfrm>
-            <a:off x="5181598" y="739666"/>
-            <a:ext cx="1828801" cy="677917"/>
-          </a:xfrm>
-          <a:prstGeom prst="rect">
-            <a:avLst/>
-          </a:prstGeom>
-        </p:spPr>
-        <p:style>
-          <a:lnRef idx="3">
-            <a:schemeClr val="lt1"/>
-          </a:lnRef>
-          <a:fillRef idx="1">
-            <a:schemeClr val="accent3"/>
-          </a:fillRef>
-          <a:effectRef idx="1">
-            <a:schemeClr val="accent3"/>
-          </a:effectRef>
-          <a:fontRef idx="minor">
-            <a:schemeClr val="lt1"/>
-          </a:fontRef>
-        </p:style>
-        <p:txBody>
-          <a:bodyPr rtlCol="0" anchor="ctr"/>
-          <a:lstStyle/>
-          <a:p>
-            <a:pPr algn="ctr"/>
-            <a:r>
-              <a:rPr kumimoji="1" lang="en-US" altLang="ko-Kore-KR" dirty="0"/>
-              <a:t>&lt;&lt;Interface&gt;&gt;</a:t>
-            </a:r>
-          </a:p>
-          <a:p>
-            <a:pPr algn="ctr"/>
-            <a:r>
-              <a:rPr kumimoji="1" lang="en-US" altLang="ko-Kore-KR" dirty="0"/>
-              <a:t>Iterator</a:t>
-            </a:r>
-            <a:endParaRPr kumimoji="1" lang="ko-Kore-KR" altLang="en-US" dirty="0"/>
-          </a:p>
-        </p:txBody>
-      </p:sp>
-      <p:cxnSp>
-        <p:nvCxnSpPr>
-          <p:cNvPr id="6" name="직선 화살표 연결선 5">
-            <a:extLst>
-              <a:ext uri="{FF2B5EF4-FFF2-40B4-BE49-F238E27FC236}">
-                <a16:creationId xmlns:a16="http://schemas.microsoft.com/office/drawing/2014/main" id="{7454DA08-36E3-92F7-40B8-0D489D533627}"/>
-              </a:ext>
-            </a:extLst>
-          </p:cNvPr>
-          <p:cNvCxnSpPr>
-            <a:stCxn id="18" idx="0"/>
-            <a:endCxn id="3" idx="2"/>
-          </p:cNvCxnSpPr>
-          <p:nvPr/>
-        </p:nvCxnSpPr>
-        <p:spPr>
-          <a:xfrm flipV="1">
-            <a:off x="6095998" y="1417583"/>
-            <a:ext cx="1" cy="1646761"/>
+            <a:off x="2957337" y="1824170"/>
+            <a:ext cx="2" cy="1760169"/>
           </a:xfrm>
           <a:prstGeom prst="straightConnector1">
             <a:avLst/>
@@ -4797,10 +3821,10 @@
       </p:cxnSp>
       <p:sp>
         <p:nvSpPr>
-          <p:cNvPr id="11" name="삼각형 10">
-            <a:extLst>
-              <a:ext uri="{FF2B5EF4-FFF2-40B4-BE49-F238E27FC236}">
-                <a16:creationId xmlns:a16="http://schemas.microsoft.com/office/drawing/2014/main" id="{36B2A171-E450-7BED-24BD-794E2A27D2D9}"/>
+          <p:cNvPr id="74" name="직사각형 73">
+            <a:extLst>
+              <a:ext uri="{FF2B5EF4-FFF2-40B4-BE49-F238E27FC236}">
+                <a16:creationId xmlns:a16="http://schemas.microsoft.com/office/drawing/2014/main" id="{D6CF5554-4137-4C9F-4556-DFFC1ED4AFFC}"/>
               </a:ext>
             </a:extLst>
           </p:cNvPr>
@@ -4809,7 +3833,62 @@
         </p:nvSpPr>
         <p:spPr>
           <a:xfrm>
-            <a:off x="5975129" y="1417583"/>
+            <a:off x="2042938" y="1146253"/>
+            <a:ext cx="1828801" cy="677917"/>
+          </a:xfrm>
+          <a:prstGeom prst="rect">
+            <a:avLst/>
+          </a:prstGeom>
+        </p:spPr>
+        <p:style>
+          <a:lnRef idx="3">
+            <a:schemeClr val="lt1"/>
+          </a:lnRef>
+          <a:fillRef idx="1">
+            <a:schemeClr val="accent3"/>
+          </a:fillRef>
+          <a:effectRef idx="1">
+            <a:schemeClr val="accent3"/>
+          </a:effectRef>
+          <a:fontRef idx="minor">
+            <a:schemeClr val="lt1"/>
+          </a:fontRef>
+        </p:style>
+        <p:txBody>
+          <a:bodyPr rtlCol="0" anchor="ctr"/>
+          <a:lstStyle/>
+          <a:p>
+            <a:pPr algn="ctr"/>
+            <a:r>
+              <a:rPr kumimoji="1" lang="en-US" altLang="ko-Kore-KR" dirty="0"/>
+              <a:t>&lt;&lt;Interface&gt;&gt;</a:t>
+            </a:r>
+          </a:p>
+          <a:p>
+            <a:pPr algn="ctr"/>
+            <a:r>
+              <a:rPr kumimoji="1" lang="en-US" altLang="ko-Kore-KR" dirty="0"/>
+              <a:t>List</a:t>
+            </a:r>
+            <a:endParaRPr kumimoji="1" lang="ko-Kore-KR" altLang="en-US" dirty="0"/>
+          </a:p>
+        </p:txBody>
+      </p:sp>
+      <p:sp>
+        <p:nvSpPr>
+          <p:cNvPr id="76" name="삼각형 75">
+            <a:extLst>
+              <a:ext uri="{FF2B5EF4-FFF2-40B4-BE49-F238E27FC236}">
+                <a16:creationId xmlns:a16="http://schemas.microsoft.com/office/drawing/2014/main" id="{14C48F61-226C-4A28-4BA5-89259ED02001}"/>
+              </a:ext>
+            </a:extLst>
+          </p:cNvPr>
+          <p:cNvSpPr/>
+          <p:nvPr/>
+        </p:nvSpPr>
+        <p:spPr>
+          <a:xfrm>
+            <a:off x="2836468" y="1850536"/>
             <a:ext cx="241738" cy="208395"/>
           </a:xfrm>
           <a:prstGeom prst="triangle">
@@ -4837,92 +3916,68 @@
           <a:lstStyle/>
           <a:p>
             <a:pPr algn="ctr"/>
-            <a:endParaRPr kumimoji="1" lang="ko-Kore-KR" altLang="en-US"/>
-          </a:p>
-        </p:txBody>
-      </p:sp>
-      <p:sp>
-        <p:nvSpPr>
-          <p:cNvPr id="16" name="다이아몬드 15">
-            <a:extLst>
-              <a:ext uri="{FF2B5EF4-FFF2-40B4-BE49-F238E27FC236}">
-                <a16:creationId xmlns:a16="http://schemas.microsoft.com/office/drawing/2014/main" id="{B8B44190-F3F6-3E76-77B6-58EEFEEDC8D2}"/>
-              </a:ext>
-            </a:extLst>
-          </p:cNvPr>
-          <p:cNvSpPr/>
+            <a:endParaRPr kumimoji="1" lang="ko-Kore-KR" altLang="en-US" dirty="0"/>
+          </a:p>
+        </p:txBody>
+      </p:sp>
+      <p:sp>
+        <p:nvSpPr>
+          <p:cNvPr id="17" name="TextBox 16">
+            <a:extLst>
+              <a:ext uri="{FF2B5EF4-FFF2-40B4-BE49-F238E27FC236}">
+                <a16:creationId xmlns:a16="http://schemas.microsoft.com/office/drawing/2014/main" id="{907EDDEF-38E5-D52B-9FA9-E8D08FE31E26}"/>
+              </a:ext>
+            </a:extLst>
+          </p:cNvPr>
+          <p:cNvSpPr txBox="1"/>
           <p:nvPr/>
         </p:nvSpPr>
         <p:spPr>
           <a:xfrm>
-            <a:off x="2748453" y="3064344"/>
-            <a:ext cx="364656" cy="364656"/>
+            <a:off x="3933154" y="1300545"/>
+            <a:ext cx="2774731" cy="369332"/>
           </a:xfrm>
-          <a:prstGeom prst="diamond">
+          <a:prstGeom prst="rect">
             <a:avLst/>
           </a:prstGeom>
         </p:spPr>
         <p:style>
           <a:lnRef idx="2">
-            <a:schemeClr val="accent1">
-              <a:shade val="50000"/>
-            </a:schemeClr>
+            <a:schemeClr val="accent3"/>
           </a:lnRef>
           <a:fillRef idx="1">
-            <a:schemeClr val="accent1"/>
+            <a:schemeClr val="lt1"/>
           </a:fillRef>
           <a:effectRef idx="0">
-            <a:schemeClr val="accent1"/>
+            <a:schemeClr val="accent3"/>
           </a:effectRef>
           <a:fontRef idx="minor">
-            <a:schemeClr val="lt1"/>
+            <a:schemeClr val="dk1"/>
           </a:fontRef>
         </p:style>
         <p:txBody>
-          <a:bodyPr rtlCol="0" anchor="ctr"/>
-          <a:lstStyle/>
-          <a:p>
-            <a:pPr algn="ctr"/>
-            <a:endParaRPr kumimoji="1" lang="ko-Kore-KR" altLang="en-US"/>
-          </a:p>
-        </p:txBody>
-      </p:sp>
-    </p:spTree>
-    <p:extLst>
-      <p:ext uri="{BB962C8B-B14F-4D97-AF65-F5344CB8AC3E}">
-        <p14:creationId xmlns:p14="http://schemas.microsoft.com/office/powerpoint/2010/main" val="2583825536"/>
-      </p:ext>
-    </p:extLst>
-  </p:cSld>
-  <p:clrMapOvr>
-    <a:masterClrMapping/>
-  </p:clrMapOvr>
-</p:sld>
-</file>
-
-<file path=ppt/slides/slide4.xml><?xml version="1.0" encoding="utf-8"?>
-<p:sld xmlns:a="http://schemas.openxmlformats.org/drawingml/2006/main" xmlns:r="http://schemas.openxmlformats.org/officeDocument/2006/relationships" xmlns:p="http://schemas.openxmlformats.org/presentationml/2006/main">
-  <p:cSld>
-    <p:spTree>
-      <p:nvGrpSpPr>
-        <p:cNvPr id="1" name=""/>
-        <p:cNvGrpSpPr/>
-        <p:nvPr/>
-      </p:nvGrpSpPr>
-      <p:grpSpPr>
-        <a:xfrm>
-          <a:off x="0" y="0"/>
-          <a:ext cx="0" cy="0"/>
-          <a:chOff x="0" y="0"/>
-          <a:chExt cx="0" cy="0"/>
-        </a:xfrm>
-      </p:grpSpPr>
-      <p:sp>
-        <p:nvSpPr>
-          <p:cNvPr id="7" name="직사각형 6">
-            <a:extLst>
-              <a:ext uri="{FF2B5EF4-FFF2-40B4-BE49-F238E27FC236}">
-                <a16:creationId xmlns:a16="http://schemas.microsoft.com/office/drawing/2014/main" id="{FE0F70A9-B948-5105-6F83-EF9C136BC26D}"/>
+          <a:bodyPr wrap="square" rtlCol="0">
+            <a:spAutoFit/>
+          </a:bodyPr>
+          <a:lstStyle/>
+          <a:p>
+            <a:pPr marL="285750" indent="-285750">
+              <a:buFont typeface="Arial" panose="020B0604020202020204" pitchFamily="34" charset="0"/>
+              <a:buChar char="•"/>
+            </a:pPr>
+            <a:r>
+              <a:rPr lang="en" altLang="ko-Kore-KR" dirty="0"/>
+              <a:t>Iterator&lt;E&gt; iterator();</a:t>
+            </a:r>
+          </a:p>
+        </p:txBody>
+      </p:sp>
+      <p:sp>
+        <p:nvSpPr>
+          <p:cNvPr id="19" name="직사각형 18">
+            <a:extLst>
+              <a:ext uri="{FF2B5EF4-FFF2-40B4-BE49-F238E27FC236}">
+                <a16:creationId xmlns:a16="http://schemas.microsoft.com/office/drawing/2014/main" id="{B1797870-10BF-D1D3-F201-EBB0BEC2BD3B}"/>
               </a:ext>
             </a:extLst>
           </p:cNvPr>
@@ -4931,8 +3986,8 @@
         </p:nvSpPr>
         <p:spPr>
           <a:xfrm>
-            <a:off x="5514562" y="2857500"/>
-            <a:ext cx="1828801" cy="677917"/>
+            <a:off x="1981520" y="3584339"/>
+            <a:ext cx="1951634" cy="756745"/>
           </a:xfrm>
           <a:prstGeom prst="rect">
             <a:avLst/>
@@ -4960,16 +4015,8 @@
           <a:p>
             <a:pPr algn="ctr"/>
             <a:r>
-              <a:rPr kumimoji="1" lang="en-US" altLang="ko-Kore-KR" dirty="0" err="1"/>
-              <a:t>ArrayList</a:t>
-            </a:r>
-            <a:endParaRPr kumimoji="1" lang="en-US" altLang="ko-Kore-KR" dirty="0"/>
-          </a:p>
-          <a:p>
-            <a:pPr algn="ctr"/>
-            <a:r>
               <a:rPr kumimoji="1" lang="en-US" altLang="ko-Kore-KR" dirty="0"/>
-              <a:t>class</a:t>
+              <a:t>LinkedList class</a:t>
             </a:r>
             <a:endParaRPr kumimoji="1" lang="ko-Kore-KR" altLang="en-US" dirty="0"/>
           </a:p>
@@ -4977,10 +4024,10 @@
       </p:sp>
       <p:sp>
         <p:nvSpPr>
-          <p:cNvPr id="18" name="TextBox 17">
-            <a:extLst>
-              <a:ext uri="{FF2B5EF4-FFF2-40B4-BE49-F238E27FC236}">
-                <a16:creationId xmlns:a16="http://schemas.microsoft.com/office/drawing/2014/main" id="{4F232CB8-A83C-2EFF-9850-CE4F847D5AAA}"/>
+          <p:cNvPr id="22" name="TextBox 21">
+            <a:extLst>
+              <a:ext uri="{FF2B5EF4-FFF2-40B4-BE49-F238E27FC236}">
+                <a16:creationId xmlns:a16="http://schemas.microsoft.com/office/drawing/2014/main" id="{A4186C72-F094-B8B6-BADC-F593A8871E13}"/>
               </a:ext>
             </a:extLst>
           </p:cNvPr>
@@ -4989,8 +4036,8 @@
         </p:nvSpPr>
         <p:spPr>
           <a:xfrm>
-            <a:off x="8719807" y="2857500"/>
-            <a:ext cx="2706419" cy="646331"/>
+            <a:off x="3999385" y="3584339"/>
+            <a:ext cx="4072759" cy="1477328"/>
           </a:xfrm>
           <a:prstGeom prst="rect">
             <a:avLst/>
@@ -4998,18 +4045,16 @@
         </p:spPr>
         <p:style>
           <a:lnRef idx="2">
-            <a:schemeClr val="accent5">
-              <a:shade val="50000"/>
-            </a:schemeClr>
+            <a:schemeClr val="accent5"/>
           </a:lnRef>
           <a:fillRef idx="1">
-            <a:schemeClr val="accent5"/>
+            <a:schemeClr val="lt1"/>
           </a:fillRef>
           <a:effectRef idx="0">
             <a:schemeClr val="accent5"/>
           </a:effectRef>
           <a:fontRef idx="minor">
-            <a:schemeClr val="lt1"/>
+            <a:schemeClr val="dk1"/>
           </a:fontRef>
         </p:style>
         <p:txBody>
@@ -5018,71 +4063,82 @@
           </a:bodyPr>
           <a:lstStyle/>
           <a:p>
-            <a:pPr algn="ctr"/>
-            <a:r>
-              <a:rPr kumimoji="1" lang="en-US" altLang="ko-Kore-KR" dirty="0" err="1"/>
-              <a:t>ArrayListIterator</a:t>
-            </a:r>
-            <a:endParaRPr kumimoji="1" lang="en-US" altLang="ko-Kore-KR" dirty="0"/>
-          </a:p>
-          <a:p>
-            <a:pPr algn="ctr"/>
-            <a:r>
-              <a:rPr kumimoji="1" lang="en-US" altLang="ko-Kore-KR" dirty="0"/>
-              <a:t>class</a:t>
-            </a:r>
-          </a:p>
-        </p:txBody>
-      </p:sp>
-      <p:cxnSp>
-        <p:nvCxnSpPr>
-          <p:cNvPr id="42" name="직선 화살표 연결선 41">
-            <a:extLst>
-              <a:ext uri="{FF2B5EF4-FFF2-40B4-BE49-F238E27FC236}">
-                <a16:creationId xmlns:a16="http://schemas.microsoft.com/office/drawing/2014/main" id="{90F6D2E0-5401-948F-D33B-E53762B575D2}"/>
-              </a:ext>
-            </a:extLst>
-          </p:cNvPr>
-          <p:cNvCxnSpPr>
-            <a:cxnSpLocks/>
-            <a:stCxn id="7" idx="3"/>
-            <a:endCxn id="18" idx="1"/>
-          </p:cNvCxnSpPr>
-          <p:nvPr/>
-        </p:nvCxnSpPr>
-        <p:spPr>
-          <a:xfrm flipV="1">
-            <a:off x="7343363" y="3180666"/>
-            <a:ext cx="1376444" cy="15793"/>
-          </a:xfrm>
-          <a:prstGeom prst="straightConnector1">
-            <a:avLst/>
-          </a:prstGeom>
-          <a:ln>
-            <a:tailEnd type="triangle"/>
-          </a:ln>
-        </p:spPr>
-        <p:style>
-          <a:lnRef idx="3">
-            <a:schemeClr val="accent1"/>
-          </a:lnRef>
-          <a:fillRef idx="0">
-            <a:schemeClr val="accent1"/>
-          </a:fillRef>
-          <a:effectRef idx="2">
-            <a:schemeClr val="accent1"/>
-          </a:effectRef>
-          <a:fontRef idx="minor">
-            <a:schemeClr val="tx1"/>
-          </a:fontRef>
-        </p:style>
-      </p:cxnSp>
-      <p:sp>
-        <p:nvSpPr>
-          <p:cNvPr id="3" name="직사각형 2">
-            <a:extLst>
-              <a:ext uri="{FF2B5EF4-FFF2-40B4-BE49-F238E27FC236}">
-                <a16:creationId xmlns:a16="http://schemas.microsoft.com/office/drawing/2014/main" id="{3E2CAA9F-9834-BA5B-C62A-384357B8EC6D}"/>
+            <a:r>
+              <a:rPr lang="en" altLang="ko-Kore-KR" dirty="0"/>
+              <a:t>return new </a:t>
+            </a:r>
+            <a:r>
+              <a:rPr lang="en" altLang="ko-Kore-KR" b="1" dirty="0">
+                <a:solidFill>
+                  <a:schemeClr val="bg1">
+                    <a:lumMod val="50000"/>
+                  </a:schemeClr>
+                </a:solidFill>
+              </a:rPr>
+              <a:t>Iterator</a:t>
+            </a:r>
+            <a:r>
+              <a:rPr lang="en" altLang="ko-Kore-KR" dirty="0"/>
+              <a:t>&lt;E&gt; (){</a:t>
+            </a:r>
+          </a:p>
+          <a:p>
+            <a:r>
+              <a:rPr lang="en" altLang="ko-Kore-KR" dirty="0"/>
+              <a:t>	override </a:t>
+            </a:r>
+            <a:r>
+              <a:rPr lang="en" altLang="ko-Kore-KR" dirty="0">
+                <a:sym typeface="Wingdings" pitchFamily="2" charset="2"/>
+              </a:rPr>
+              <a:t> </a:t>
+            </a:r>
+            <a:r>
+              <a:rPr lang="en" altLang="ko-Kore-KR" dirty="0" err="1"/>
+              <a:t>hasNext</a:t>
+            </a:r>
+            <a:r>
+              <a:rPr lang="en" altLang="ko-Kore-KR" dirty="0"/>
+              <a:t>();</a:t>
+            </a:r>
+          </a:p>
+          <a:p>
+            <a:r>
+              <a:rPr lang="en" altLang="ko-Kore-KR" dirty="0"/>
+              <a:t>	override </a:t>
+            </a:r>
+            <a:r>
+              <a:rPr lang="en" altLang="ko-Kore-KR" dirty="0">
+                <a:sym typeface="Wingdings" pitchFamily="2" charset="2"/>
+              </a:rPr>
+              <a:t> </a:t>
+            </a:r>
+            <a:r>
+              <a:rPr lang="en" altLang="ko-Kore-KR" dirty="0"/>
+              <a:t>next();</a:t>
+            </a:r>
+          </a:p>
+          <a:p>
+            <a:r>
+              <a:rPr lang="en" altLang="ko-Kore-KR" dirty="0"/>
+              <a:t>};</a:t>
+            </a:r>
+          </a:p>
+          <a:p>
+            <a:pPr marL="285750" indent="-285750">
+              <a:buFont typeface="Arial" panose="020B0604020202020204" pitchFamily="34" charset="0"/>
+              <a:buChar char="•"/>
+            </a:pPr>
+            <a:endParaRPr kumimoji="1" lang="ko-Kore-KR" altLang="en-US" dirty="0"/>
+          </a:p>
+        </p:txBody>
+      </p:sp>
+      <p:sp>
+        <p:nvSpPr>
+          <p:cNvPr id="24" name="직사각형 23">
+            <a:extLst>
+              <a:ext uri="{FF2B5EF4-FFF2-40B4-BE49-F238E27FC236}">
+                <a16:creationId xmlns:a16="http://schemas.microsoft.com/office/drawing/2014/main" id="{3D699C57-4CDF-B70E-0A36-A7FBC54C01E5}"/>
               </a:ext>
             </a:extLst>
           </p:cNvPr>
@@ -5091,7 +4147,7 @@
         </p:nvSpPr>
         <p:spPr>
           <a:xfrm>
-            <a:off x="9143997" y="687115"/>
+            <a:off x="5213131" y="2380111"/>
             <a:ext cx="1828801" cy="677917"/>
           </a:xfrm>
           <a:prstGeom prst="rect">
@@ -5134,23 +4190,24 @@
       </p:sp>
       <p:cxnSp>
         <p:nvCxnSpPr>
-          <p:cNvPr id="6" name="직선 화살표 연결선 5">
-            <a:extLst>
-              <a:ext uri="{FF2B5EF4-FFF2-40B4-BE49-F238E27FC236}">
-                <a16:creationId xmlns:a16="http://schemas.microsoft.com/office/drawing/2014/main" id="{7454DA08-36E3-92F7-40B8-0D489D533627}"/>
+          <p:cNvPr id="25" name="직선 화살표 연결선 24">
+            <a:extLst>
+              <a:ext uri="{FF2B5EF4-FFF2-40B4-BE49-F238E27FC236}">
+                <a16:creationId xmlns:a16="http://schemas.microsoft.com/office/drawing/2014/main" id="{1ACF239F-039C-2C96-A6C7-A7D1BB7DE384}"/>
               </a:ext>
             </a:extLst>
           </p:cNvPr>
           <p:cNvCxnSpPr>
-            <a:stCxn id="18" idx="0"/>
-            <a:endCxn id="3" idx="2"/>
+            <a:cxnSpLocks/>
+            <a:stCxn id="22" idx="0"/>
+            <a:endCxn id="29" idx="3"/>
           </p:cNvCxnSpPr>
           <p:nvPr/>
         </p:nvCxnSpPr>
         <p:spPr>
           <a:xfrm flipH="1" flipV="1">
-            <a:off x="10058398" y="1365032"/>
-            <a:ext cx="14619" cy="1492468"/>
+            <a:off x="6029690" y="3219494"/>
+            <a:ext cx="6075" cy="364845"/>
           </a:xfrm>
           <a:prstGeom prst="straightConnector1">
             <a:avLst/>
@@ -5182,10 +4239,10 @@
       </p:cxnSp>
       <p:sp>
         <p:nvSpPr>
-          <p:cNvPr id="11" name="삼각형 10">
-            <a:extLst>
-              <a:ext uri="{FF2B5EF4-FFF2-40B4-BE49-F238E27FC236}">
-                <a16:creationId xmlns:a16="http://schemas.microsoft.com/office/drawing/2014/main" id="{36B2A171-E450-7BED-24BD-794E2A27D2D9}"/>
+          <p:cNvPr id="29" name="삼각형 28">
+            <a:extLst>
+              <a:ext uri="{FF2B5EF4-FFF2-40B4-BE49-F238E27FC236}">
+                <a16:creationId xmlns:a16="http://schemas.microsoft.com/office/drawing/2014/main" id="{2A9232C1-F53A-466C-7117-6D2CCB63B568}"/>
               </a:ext>
             </a:extLst>
           </p:cNvPr>
@@ -5193,8 +4250,8 @@
           <p:nvPr/>
         </p:nvSpPr>
         <p:spPr>
-          <a:xfrm>
-            <a:off x="9937528" y="1365032"/>
+          <a:xfrm rot="21589369">
+            <a:off x="5908499" y="3011099"/>
             <a:ext cx="241738" cy="208395"/>
           </a:xfrm>
           <a:prstGeom prst="triangle">
@@ -5222,116 +4279,26 @@
           <a:lstStyle/>
           <a:p>
             <a:pPr algn="ctr"/>
-            <a:endParaRPr kumimoji="1" lang="ko-Kore-KR" altLang="en-US"/>
-          </a:p>
-        </p:txBody>
-      </p:sp>
-      <p:sp>
-        <p:nvSpPr>
-          <p:cNvPr id="16" name="다이아몬드 15">
-            <a:extLst>
-              <a:ext uri="{FF2B5EF4-FFF2-40B4-BE49-F238E27FC236}">
-                <a16:creationId xmlns:a16="http://schemas.microsoft.com/office/drawing/2014/main" id="{B8B44190-F3F6-3E76-77B6-58EEFEEDC8D2}"/>
-              </a:ext>
-            </a:extLst>
-          </p:cNvPr>
-          <p:cNvSpPr/>
+            <a:endParaRPr kumimoji="1" lang="ko-Kore-KR" altLang="en-US" dirty="0"/>
+          </a:p>
+        </p:txBody>
+      </p:sp>
+      <p:sp>
+        <p:nvSpPr>
+          <p:cNvPr id="30" name="TextBox 29">
+            <a:extLst>
+              <a:ext uri="{FF2B5EF4-FFF2-40B4-BE49-F238E27FC236}">
+                <a16:creationId xmlns:a16="http://schemas.microsoft.com/office/drawing/2014/main" id="{3156A531-FC4C-0586-6BCE-5DC9CC88D753}"/>
+              </a:ext>
+            </a:extLst>
+          </p:cNvPr>
+          <p:cNvSpPr txBox="1"/>
           <p:nvPr/>
         </p:nvSpPr>
         <p:spPr>
           <a:xfrm>
-            <a:off x="7343363" y="3022028"/>
-            <a:ext cx="364656" cy="364656"/>
-          </a:xfrm>
-          <a:prstGeom prst="diamond">
-            <a:avLst/>
-          </a:prstGeom>
-        </p:spPr>
-        <p:style>
-          <a:lnRef idx="2">
-            <a:schemeClr val="accent1">
-              <a:shade val="50000"/>
-            </a:schemeClr>
-          </a:lnRef>
-          <a:fillRef idx="1">
-            <a:schemeClr val="accent1"/>
-          </a:fillRef>
-          <a:effectRef idx="0">
-            <a:schemeClr val="accent1"/>
-          </a:effectRef>
-          <a:fontRef idx="minor">
-            <a:schemeClr val="lt1"/>
-          </a:fontRef>
-        </p:style>
-        <p:txBody>
-          <a:bodyPr rtlCol="0" anchor="ctr"/>
-          <a:lstStyle/>
-          <a:p>
-            <a:pPr algn="ctr"/>
-            <a:endParaRPr kumimoji="1" lang="ko-Kore-KR" altLang="en-US"/>
-          </a:p>
-        </p:txBody>
-      </p:sp>
-      <p:sp>
-        <p:nvSpPr>
-          <p:cNvPr id="9" name="웃는 얼굴[S] 8">
-            <a:extLst>
-              <a:ext uri="{FF2B5EF4-FFF2-40B4-BE49-F238E27FC236}">
-                <a16:creationId xmlns:a16="http://schemas.microsoft.com/office/drawing/2014/main" id="{9AD281F6-8FBE-AF90-8550-860B19166E98}"/>
-              </a:ext>
-            </a:extLst>
-          </p:cNvPr>
-          <p:cNvSpPr/>
-          <p:nvPr/>
-        </p:nvSpPr>
-        <p:spPr>
-          <a:xfrm>
-            <a:off x="819809" y="2461681"/>
-            <a:ext cx="1313793" cy="1313793"/>
-          </a:xfrm>
-          <a:prstGeom prst="smileyFace">
-            <a:avLst/>
-          </a:prstGeom>
-        </p:spPr>
-        <p:style>
-          <a:lnRef idx="3">
-            <a:schemeClr val="lt1"/>
-          </a:lnRef>
-          <a:fillRef idx="1">
-            <a:schemeClr val="accent4"/>
-          </a:fillRef>
-          <a:effectRef idx="1">
-            <a:schemeClr val="accent4"/>
-          </a:effectRef>
-          <a:fontRef idx="minor">
-            <a:schemeClr val="lt1"/>
-          </a:fontRef>
-        </p:style>
-        <p:txBody>
-          <a:bodyPr rtlCol="0" anchor="ctr"/>
-          <a:lstStyle/>
-          <a:p>
-            <a:pPr algn="ctr"/>
-            <a:endParaRPr kumimoji="1" lang="ko-Kore-KR" altLang="en-US"/>
-          </a:p>
-        </p:txBody>
-      </p:sp>
-      <p:sp>
-        <p:nvSpPr>
-          <p:cNvPr id="10" name="TextBox 9">
-            <a:extLst>
-              <a:ext uri="{FF2B5EF4-FFF2-40B4-BE49-F238E27FC236}">
-                <a16:creationId xmlns:a16="http://schemas.microsoft.com/office/drawing/2014/main" id="{F059417A-1666-A201-A3EB-C2369ABB6376}"/>
-              </a:ext>
-            </a:extLst>
-          </p:cNvPr>
-          <p:cNvSpPr txBox="1"/>
-          <p:nvPr/>
-        </p:nvSpPr>
-        <p:spPr>
-          <a:xfrm>
-            <a:off x="945932" y="2024905"/>
-            <a:ext cx="1061545" cy="369332"/>
+            <a:off x="7166751" y="2383401"/>
+            <a:ext cx="2774731" cy="646331"/>
           </a:xfrm>
           <a:prstGeom prst="rect">
             <a:avLst/>
@@ -5339,13 +4306,13 @@
         </p:spPr>
         <p:style>
           <a:lnRef idx="2">
-            <a:schemeClr val="accent4"/>
+            <a:schemeClr val="accent3"/>
           </a:lnRef>
           <a:fillRef idx="1">
             <a:schemeClr val="lt1"/>
           </a:fillRef>
           <a:effectRef idx="0">
-            <a:schemeClr val="accent4"/>
+            <a:schemeClr val="accent3"/>
           </a:effectRef>
           <a:fontRef idx="minor">
             <a:schemeClr val="dk1"/>
@@ -5357,1358 +4324,28 @@
           </a:bodyPr>
           <a:lstStyle/>
           <a:p>
-            <a:r>
-              <a:rPr kumimoji="1" lang="en-US" altLang="ko-Kore-KR" dirty="0"/>
-              <a:t>Test01</a:t>
-            </a:r>
-            <a:endParaRPr kumimoji="1" lang="ko-Kore-KR" altLang="en-US" dirty="0"/>
-          </a:p>
-        </p:txBody>
-      </p:sp>
-      <p:cxnSp>
-        <p:nvCxnSpPr>
-          <p:cNvPr id="13" name="직선 화살표 연결선 12">
-            <a:extLst>
-              <a:ext uri="{FF2B5EF4-FFF2-40B4-BE49-F238E27FC236}">
-                <a16:creationId xmlns:a16="http://schemas.microsoft.com/office/drawing/2014/main" id="{802D944C-A824-0AC2-724D-C6C5E9004EF8}"/>
-              </a:ext>
-            </a:extLst>
-          </p:cNvPr>
-          <p:cNvCxnSpPr>
-            <a:cxnSpLocks/>
-            <a:stCxn id="9" idx="7"/>
-            <a:endCxn id="7" idx="0"/>
-          </p:cNvCxnSpPr>
-          <p:nvPr/>
-        </p:nvCxnSpPr>
-        <p:spPr>
-          <a:xfrm>
-            <a:off x="1941201" y="2654082"/>
-            <a:ext cx="4487762" cy="203418"/>
-          </a:xfrm>
-          <a:prstGeom prst="straightConnector1">
-            <a:avLst/>
-          </a:prstGeom>
-          <a:ln>
-            <a:tailEnd type="triangle"/>
-          </a:ln>
-        </p:spPr>
-        <p:style>
-          <a:lnRef idx="3">
-            <a:schemeClr val="accent4"/>
-          </a:lnRef>
-          <a:fillRef idx="0">
-            <a:schemeClr val="accent4"/>
-          </a:fillRef>
-          <a:effectRef idx="2">
-            <a:schemeClr val="accent4"/>
-          </a:effectRef>
-          <a:fontRef idx="minor">
-            <a:schemeClr val="tx1"/>
-          </a:fontRef>
-        </p:style>
-      </p:cxnSp>
-      <p:cxnSp>
-        <p:nvCxnSpPr>
-          <p:cNvPr id="15" name="직선 화살표 연결선 14">
-            <a:extLst>
-              <a:ext uri="{FF2B5EF4-FFF2-40B4-BE49-F238E27FC236}">
-                <a16:creationId xmlns:a16="http://schemas.microsoft.com/office/drawing/2014/main" id="{EB09BD6B-2D06-DC57-BCCE-830F58840380}"/>
-              </a:ext>
-            </a:extLst>
-          </p:cNvPr>
-          <p:cNvCxnSpPr>
-            <a:cxnSpLocks/>
-            <a:stCxn id="7" idx="2"/>
-            <a:endCxn id="9" idx="5"/>
-          </p:cNvCxnSpPr>
-          <p:nvPr/>
-        </p:nvCxnSpPr>
-        <p:spPr>
-          <a:xfrm flipH="1">
-            <a:off x="1941201" y="3535417"/>
-            <a:ext cx="4487762" cy="47656"/>
-          </a:xfrm>
-          <a:prstGeom prst="straightConnector1">
-            <a:avLst/>
-          </a:prstGeom>
-          <a:ln>
-            <a:tailEnd type="triangle"/>
-          </a:ln>
-        </p:spPr>
-        <p:style>
-          <a:lnRef idx="3">
-            <a:schemeClr val="accent4"/>
-          </a:lnRef>
-          <a:fillRef idx="0">
-            <a:schemeClr val="accent4"/>
-          </a:fillRef>
-          <a:effectRef idx="2">
-            <a:schemeClr val="accent4"/>
-          </a:effectRef>
-          <a:fontRef idx="minor">
-            <a:schemeClr val="tx1"/>
-          </a:fontRef>
-        </p:style>
-      </p:cxnSp>
-      <p:cxnSp>
-        <p:nvCxnSpPr>
-          <p:cNvPr id="26" name="구부러진 연결선[U] 25">
-            <a:extLst>
-              <a:ext uri="{FF2B5EF4-FFF2-40B4-BE49-F238E27FC236}">
-                <a16:creationId xmlns:a16="http://schemas.microsoft.com/office/drawing/2014/main" id="{3C94107B-DD19-38C3-FE99-B7CD74285F75}"/>
-              </a:ext>
-            </a:extLst>
-          </p:cNvPr>
-          <p:cNvCxnSpPr>
-            <a:stCxn id="9" idx="4"/>
-            <a:endCxn id="18" idx="2"/>
-          </p:cNvCxnSpPr>
-          <p:nvPr/>
-        </p:nvCxnSpPr>
-        <p:spPr>
-          <a:xfrm rot="5400000" flipH="1" flipV="1">
-            <a:off x="5639039" y="-658503"/>
-            <a:ext cx="271643" cy="8596311"/>
-          </a:xfrm>
-          <a:prstGeom prst="curvedConnector3">
-            <a:avLst>
-              <a:gd name="adj1" fmla="val -84155"/>
-            </a:avLst>
-          </a:prstGeom>
-          <a:ln>
-            <a:tailEnd type="triangle"/>
-          </a:ln>
-        </p:spPr>
-        <p:style>
-          <a:lnRef idx="3">
-            <a:schemeClr val="accent2"/>
-          </a:lnRef>
-          <a:fillRef idx="0">
-            <a:schemeClr val="accent2"/>
-          </a:fillRef>
-          <a:effectRef idx="2">
-            <a:schemeClr val="accent2"/>
-          </a:effectRef>
-          <a:fontRef idx="minor">
-            <a:schemeClr val="tx1"/>
-          </a:fontRef>
-        </p:style>
-      </p:cxnSp>
-      <p:sp>
-        <p:nvSpPr>
-          <p:cNvPr id="27" name="TextBox 26">
-            <a:extLst>
-              <a:ext uri="{FF2B5EF4-FFF2-40B4-BE49-F238E27FC236}">
-                <a16:creationId xmlns:a16="http://schemas.microsoft.com/office/drawing/2014/main" id="{2ECC67E2-C8A2-2F6D-CF7F-4FD1ACEAF1C1}"/>
-              </a:ext>
-            </a:extLst>
-          </p:cNvPr>
-          <p:cNvSpPr txBox="1"/>
-          <p:nvPr/>
-        </p:nvSpPr>
-        <p:spPr>
-          <a:xfrm>
-            <a:off x="3095867" y="2599106"/>
-            <a:ext cx="1742090" cy="369332"/>
-          </a:xfrm>
-          <a:prstGeom prst="rect">
-            <a:avLst/>
-          </a:prstGeom>
-        </p:spPr>
-        <p:style>
-          <a:lnRef idx="2">
-            <a:schemeClr val="accent4"/>
-          </a:lnRef>
-          <a:fillRef idx="1">
-            <a:schemeClr val="lt1"/>
-          </a:fillRef>
-          <a:effectRef idx="0">
-            <a:schemeClr val="accent4"/>
-          </a:effectRef>
-          <a:fontRef idx="minor">
-            <a:schemeClr val="dk1"/>
-          </a:fontRef>
-        </p:style>
-        <p:txBody>
-          <a:bodyPr wrap="square" rtlCol="0">
-            <a:spAutoFit/>
-          </a:bodyPr>
-          <a:lstStyle/>
-          <a:p>
-            <a:r>
-              <a:rPr kumimoji="1" lang="en-US" altLang="ko-Kore-KR" dirty="0"/>
-              <a:t>1. iterator()</a:t>
-            </a:r>
-          </a:p>
-        </p:txBody>
-      </p:sp>
-      <p:sp>
-        <p:nvSpPr>
-          <p:cNvPr id="28" name="TextBox 27">
-            <a:extLst>
-              <a:ext uri="{FF2B5EF4-FFF2-40B4-BE49-F238E27FC236}">
-                <a16:creationId xmlns:a16="http://schemas.microsoft.com/office/drawing/2014/main" id="{A8969F77-94AC-C2A1-A069-1C13A4194908}"/>
-              </a:ext>
-            </a:extLst>
-          </p:cNvPr>
-          <p:cNvSpPr txBox="1"/>
-          <p:nvPr/>
-        </p:nvSpPr>
-        <p:spPr>
-          <a:xfrm>
-            <a:off x="7484680" y="2487220"/>
-            <a:ext cx="1134706" cy="369332"/>
-          </a:xfrm>
-          <a:prstGeom prst="rect">
-            <a:avLst/>
-          </a:prstGeom>
-        </p:spPr>
-        <p:style>
-          <a:lnRef idx="2">
-            <a:schemeClr val="accent5"/>
-          </a:lnRef>
-          <a:fillRef idx="1">
-            <a:schemeClr val="lt1"/>
-          </a:fillRef>
-          <a:effectRef idx="0">
-            <a:schemeClr val="accent5"/>
-          </a:effectRef>
-          <a:fontRef idx="minor">
-            <a:schemeClr val="dk1"/>
-          </a:fontRef>
-        </p:style>
-        <p:txBody>
-          <a:bodyPr wrap="square" rtlCol="0">
-            <a:spAutoFit/>
-          </a:bodyPr>
-          <a:lstStyle/>
-          <a:p>
-            <a:r>
-              <a:rPr kumimoji="1" lang="en-US" altLang="ko-Kore-KR" dirty="0"/>
-              <a:t>2. new</a:t>
-            </a:r>
-          </a:p>
-        </p:txBody>
-      </p:sp>
-      <p:sp>
-        <p:nvSpPr>
-          <p:cNvPr id="29" name="TextBox 28">
-            <a:extLst>
-              <a:ext uri="{FF2B5EF4-FFF2-40B4-BE49-F238E27FC236}">
-                <a16:creationId xmlns:a16="http://schemas.microsoft.com/office/drawing/2014/main" id="{979DAA10-BB6E-6726-80BE-B1CE7DEB16D9}"/>
-              </a:ext>
-            </a:extLst>
-          </p:cNvPr>
-          <p:cNvSpPr txBox="1"/>
-          <p:nvPr/>
-        </p:nvSpPr>
-        <p:spPr>
-          <a:xfrm>
-            <a:off x="3092791" y="3381125"/>
-            <a:ext cx="1742090" cy="369332"/>
-          </a:xfrm>
-          <a:prstGeom prst="rect">
-            <a:avLst/>
-          </a:prstGeom>
-        </p:spPr>
-        <p:style>
-          <a:lnRef idx="2">
-            <a:schemeClr val="accent4"/>
-          </a:lnRef>
-          <a:fillRef idx="1">
-            <a:schemeClr val="lt1"/>
-          </a:fillRef>
-          <a:effectRef idx="0">
-            <a:schemeClr val="accent4"/>
-          </a:effectRef>
-          <a:fontRef idx="minor">
-            <a:schemeClr val="dk1"/>
-          </a:fontRef>
-        </p:style>
-        <p:txBody>
-          <a:bodyPr wrap="square" rtlCol="0">
-            <a:spAutoFit/>
-          </a:bodyPr>
-          <a:lstStyle/>
-          <a:p>
-            <a:r>
-              <a:rPr kumimoji="1" lang="en-US" altLang="ko-Kore-KR" dirty="0"/>
-              <a:t>3. Iterator </a:t>
-            </a:r>
-            <a:r>
-              <a:rPr kumimoji="1" lang="ko-Kore-KR" altLang="en-US" dirty="0"/>
-              <a:t>리턴</a:t>
-            </a:r>
-            <a:endParaRPr kumimoji="1" lang="en-US" altLang="ko-Kore-KR" dirty="0"/>
-          </a:p>
-        </p:txBody>
-      </p:sp>
-      <p:sp>
-        <p:nvSpPr>
-          <p:cNvPr id="14" name="TextBox 13">
-            <a:extLst>
-              <a:ext uri="{FF2B5EF4-FFF2-40B4-BE49-F238E27FC236}">
-                <a16:creationId xmlns:a16="http://schemas.microsoft.com/office/drawing/2014/main" id="{12424D5B-79B7-CF39-074C-257708FF3616}"/>
-              </a:ext>
-            </a:extLst>
-          </p:cNvPr>
-          <p:cNvSpPr txBox="1"/>
-          <p:nvPr/>
-        </p:nvSpPr>
-        <p:spPr>
-          <a:xfrm>
-            <a:off x="5601273" y="3720082"/>
-            <a:ext cx="1742090" cy="646331"/>
-          </a:xfrm>
-          <a:prstGeom prst="rect">
-            <a:avLst/>
-          </a:prstGeom>
-        </p:spPr>
-        <p:style>
-          <a:lnRef idx="2">
-            <a:schemeClr val="accent2"/>
-          </a:lnRef>
-          <a:fillRef idx="1">
-            <a:schemeClr val="lt1"/>
-          </a:fillRef>
-          <a:effectRef idx="0">
-            <a:schemeClr val="accent2"/>
-          </a:effectRef>
-          <a:fontRef idx="minor">
-            <a:schemeClr val="dk1"/>
-          </a:fontRef>
-        </p:style>
-        <p:txBody>
-          <a:bodyPr wrap="square" rtlCol="0">
-            <a:spAutoFit/>
-          </a:bodyPr>
-          <a:lstStyle/>
-          <a:p>
-            <a:r>
-              <a:rPr kumimoji="1" lang="en-US" altLang="ko-KR" dirty="0"/>
-              <a:t>4.</a:t>
-            </a:r>
-            <a:r>
-              <a:rPr kumimoji="1" lang="ko-KR" altLang="en-US" dirty="0"/>
-              <a:t> </a:t>
-            </a:r>
-            <a:r>
-              <a:rPr kumimoji="1" lang="en-US" altLang="ko-Kore-KR" dirty="0"/>
-              <a:t>if(</a:t>
-            </a:r>
-            <a:r>
-              <a:rPr kumimoji="1" lang="en-US" altLang="ko-Kore-KR" dirty="0" err="1"/>
+            <a:pPr marL="285750" indent="-285750">
+              <a:buFont typeface="Arial" panose="020B0604020202020204" pitchFamily="34" charset="0"/>
+              <a:buChar char="•"/>
+            </a:pPr>
+            <a:r>
+              <a:rPr lang="en" altLang="ko-Kore-KR" dirty="0" err="1"/>
               <a:t>hasNext</a:t>
             </a:r>
             <a:r>
-              <a:rPr kumimoji="1" lang="en-US" altLang="ko-Kore-KR" dirty="0"/>
-              <a:t>())</a:t>
-            </a:r>
-          </a:p>
-          <a:p>
-            <a:r>
-              <a:rPr kumimoji="1" lang="en-US" altLang="ko-Kore-KR" dirty="0">
-                <a:sym typeface="Wingdings" pitchFamily="2" charset="2"/>
-              </a:rPr>
-              <a:t> next();</a:t>
-            </a:r>
-            <a:endParaRPr kumimoji="1" lang="ko-Kore-KR" altLang="en-US" dirty="0"/>
-          </a:p>
-        </p:txBody>
-      </p:sp>
-      <p:cxnSp>
-        <p:nvCxnSpPr>
-          <p:cNvPr id="31" name="구부러진 연결선[U] 30">
-            <a:extLst>
-              <a:ext uri="{FF2B5EF4-FFF2-40B4-BE49-F238E27FC236}">
-                <a16:creationId xmlns:a16="http://schemas.microsoft.com/office/drawing/2014/main" id="{A3255819-DEB2-5CD0-4DDC-33CC23496067}"/>
-              </a:ext>
-            </a:extLst>
-          </p:cNvPr>
-          <p:cNvCxnSpPr>
-            <a:stCxn id="18" idx="0"/>
-            <a:endCxn id="7" idx="0"/>
-          </p:cNvCxnSpPr>
-          <p:nvPr/>
-        </p:nvCxnSpPr>
-        <p:spPr>
-          <a:xfrm rot="16200000" flipV="1">
-            <a:off x="8250990" y="1035473"/>
-            <a:ext cx="12700" cy="3644054"/>
-          </a:xfrm>
-          <a:prstGeom prst="curvedConnector3">
-            <a:avLst>
-              <a:gd name="adj1" fmla="val 9000000"/>
-            </a:avLst>
-          </a:prstGeom>
-          <a:ln>
-            <a:solidFill>
-              <a:srgbClr val="FF0000"/>
-            </a:solidFill>
-            <a:tailEnd type="triangle"/>
-          </a:ln>
-        </p:spPr>
-        <p:style>
-          <a:lnRef idx="1">
-            <a:schemeClr val="accent1"/>
-          </a:lnRef>
-          <a:fillRef idx="0">
-            <a:schemeClr val="accent1"/>
-          </a:fillRef>
-          <a:effectRef idx="0">
-            <a:schemeClr val="accent1"/>
-          </a:effectRef>
-          <a:fontRef idx="minor">
-            <a:schemeClr val="tx1"/>
-          </a:fontRef>
-        </p:style>
-      </p:cxnSp>
-      <p:sp>
-        <p:nvSpPr>
-          <p:cNvPr id="33" name="TextBox 32">
-            <a:extLst>
-              <a:ext uri="{FF2B5EF4-FFF2-40B4-BE49-F238E27FC236}">
-                <a16:creationId xmlns:a16="http://schemas.microsoft.com/office/drawing/2014/main" id="{5942CE1F-CF23-3A9A-EDD8-85E6D59249BD}"/>
-              </a:ext>
-            </a:extLst>
-          </p:cNvPr>
-          <p:cNvSpPr txBox="1"/>
-          <p:nvPr/>
-        </p:nvSpPr>
-        <p:spPr>
-          <a:xfrm>
-            <a:off x="7708019" y="1573427"/>
-            <a:ext cx="1134706" cy="369332"/>
-          </a:xfrm>
-          <a:prstGeom prst="rect">
-            <a:avLst/>
-          </a:prstGeom>
-          <a:ln>
-            <a:solidFill>
-              <a:srgbClr val="FF0000"/>
-            </a:solidFill>
-          </a:ln>
-        </p:spPr>
-        <p:style>
-          <a:lnRef idx="2">
-            <a:schemeClr val="accent5"/>
-          </a:lnRef>
-          <a:fillRef idx="1">
-            <a:schemeClr val="lt1"/>
-          </a:fillRef>
-          <a:effectRef idx="0">
-            <a:schemeClr val="accent5"/>
-          </a:effectRef>
-          <a:fontRef idx="minor">
-            <a:schemeClr val="dk1"/>
-          </a:fontRef>
-        </p:style>
-        <p:txBody>
-          <a:bodyPr wrap="square" rtlCol="0">
-            <a:spAutoFit/>
-          </a:bodyPr>
-          <a:lstStyle/>
-          <a:p>
-            <a:r>
-              <a:rPr kumimoji="1" lang="en-US" altLang="ko-KR" dirty="0"/>
-              <a:t>this</a:t>
-            </a:r>
-            <a:r>
-              <a:rPr kumimoji="1" lang="ko-KR" altLang="en-US" dirty="0"/>
-              <a:t> 이용</a:t>
-            </a:r>
-            <a:endParaRPr kumimoji="1" lang="en-US" altLang="ko-Kore-KR" dirty="0"/>
-          </a:p>
-        </p:txBody>
-      </p:sp>
-    </p:spTree>
-    <p:extLst>
-      <p:ext uri="{BB962C8B-B14F-4D97-AF65-F5344CB8AC3E}">
-        <p14:creationId xmlns:p14="http://schemas.microsoft.com/office/powerpoint/2010/main" val="1111160965"/>
-      </p:ext>
-    </p:extLst>
-  </p:cSld>
-  <p:clrMapOvr>
-    <a:masterClrMapping/>
-  </p:clrMapOvr>
-</p:sld>
-</file>
-
-<file path=ppt/slides/slide5.xml><?xml version="1.0" encoding="utf-8"?>
-<p:sld xmlns:a="http://schemas.openxmlformats.org/drawingml/2006/main" xmlns:r="http://schemas.openxmlformats.org/officeDocument/2006/relationships" xmlns:p="http://schemas.openxmlformats.org/presentationml/2006/main">
-  <p:cSld>
-    <p:spTree>
-      <p:nvGrpSpPr>
-        <p:cNvPr id="1" name=""/>
-        <p:cNvGrpSpPr/>
-        <p:nvPr/>
-      </p:nvGrpSpPr>
-      <p:grpSpPr>
-        <a:xfrm>
-          <a:off x="0" y="0"/>
-          <a:ext cx="0" cy="0"/>
-          <a:chOff x="0" y="0"/>
-          <a:chExt cx="0" cy="0"/>
-        </a:xfrm>
-      </p:grpSpPr>
-      <p:cxnSp>
-        <p:nvCxnSpPr>
-          <p:cNvPr id="75" name="직선 화살표 연결선 74">
-            <a:extLst>
-              <a:ext uri="{FF2B5EF4-FFF2-40B4-BE49-F238E27FC236}">
-                <a16:creationId xmlns:a16="http://schemas.microsoft.com/office/drawing/2014/main" id="{6D35E7B3-3A74-489D-2B33-6F19BBD938EE}"/>
-              </a:ext>
-            </a:extLst>
-          </p:cNvPr>
-          <p:cNvCxnSpPr>
-            <a:cxnSpLocks/>
-            <a:stCxn id="10" idx="0"/>
-            <a:endCxn id="74" idx="2"/>
-          </p:cNvCxnSpPr>
-          <p:nvPr/>
-        </p:nvCxnSpPr>
-        <p:spPr>
-          <a:xfrm flipV="1">
-            <a:off x="4218579" y="773136"/>
-            <a:ext cx="1" cy="5033830"/>
-          </a:xfrm>
-          <a:prstGeom prst="straightConnector1">
-            <a:avLst/>
-          </a:prstGeom>
-          <a:ln w="9525" cap="flat" cmpd="sng" algn="ctr">
-            <a:solidFill>
-              <a:schemeClr val="accent3"/>
-            </a:solidFill>
-            <a:prstDash val="dash"/>
-            <a:round/>
-            <a:headEnd type="none" w="med" len="med"/>
-            <a:tailEnd type="none" w="med" len="med"/>
-          </a:ln>
-        </p:spPr>
-        <p:style>
-          <a:lnRef idx="0">
-            <a:scrgbClr r="0" g="0" b="0"/>
-          </a:lnRef>
-          <a:fillRef idx="0">
-            <a:scrgbClr r="0" g="0" b="0"/>
-          </a:fillRef>
-          <a:effectRef idx="0">
-            <a:scrgbClr r="0" g="0" b="0"/>
-          </a:effectRef>
-          <a:fontRef idx="minor">
-            <a:schemeClr val="tx1"/>
-          </a:fontRef>
-        </p:style>
-      </p:cxnSp>
-      <p:sp>
-        <p:nvSpPr>
-          <p:cNvPr id="4" name="직사각형 3">
-            <a:extLst>
-              <a:ext uri="{FF2B5EF4-FFF2-40B4-BE49-F238E27FC236}">
-                <a16:creationId xmlns:a16="http://schemas.microsoft.com/office/drawing/2014/main" id="{92D1EBF9-BF79-C348-542E-7867D7EFD64A}"/>
-              </a:ext>
-            </a:extLst>
-          </p:cNvPr>
-          <p:cNvSpPr/>
-          <p:nvPr/>
-        </p:nvSpPr>
-        <p:spPr>
-          <a:xfrm>
-            <a:off x="3148494" y="1573926"/>
-            <a:ext cx="2140173" cy="677917"/>
-          </a:xfrm>
-          <a:prstGeom prst="rect">
-            <a:avLst/>
-          </a:prstGeom>
-        </p:spPr>
-        <p:style>
-          <a:lnRef idx="2">
-            <a:schemeClr val="accent1">
-              <a:shade val="50000"/>
-            </a:schemeClr>
-          </a:lnRef>
-          <a:fillRef idx="1">
-            <a:schemeClr val="accent1"/>
-          </a:fillRef>
-          <a:effectRef idx="0">
-            <a:schemeClr val="accent1"/>
-          </a:effectRef>
-          <a:fontRef idx="minor">
-            <a:schemeClr val="lt1"/>
-          </a:fontRef>
-        </p:style>
-        <p:txBody>
-          <a:bodyPr rtlCol="0" anchor="ctr"/>
-          <a:lstStyle/>
-          <a:p>
-            <a:pPr algn="ctr"/>
-            <a:r>
-              <a:rPr kumimoji="1" lang="en-US" altLang="ko-Kore-KR" dirty="0" err="1"/>
-              <a:t>ArrayListIterator</a:t>
-            </a:r>
-            <a:endParaRPr kumimoji="1" lang="ko-Kore-KR" altLang="en-US" dirty="0"/>
-          </a:p>
-        </p:txBody>
-      </p:sp>
-      <p:sp>
-        <p:nvSpPr>
-          <p:cNvPr id="7" name="직사각형 6">
-            <a:extLst>
-              <a:ext uri="{FF2B5EF4-FFF2-40B4-BE49-F238E27FC236}">
-                <a16:creationId xmlns:a16="http://schemas.microsoft.com/office/drawing/2014/main" id="{FE0F70A9-B948-5105-6F83-EF9C136BC26D}"/>
-              </a:ext>
-            </a:extLst>
-          </p:cNvPr>
-          <p:cNvSpPr/>
-          <p:nvPr/>
-        </p:nvSpPr>
-        <p:spPr>
-          <a:xfrm>
-            <a:off x="3148493" y="2609195"/>
-            <a:ext cx="2140173" cy="677917"/>
-          </a:xfrm>
-          <a:prstGeom prst="rect">
-            <a:avLst/>
-          </a:prstGeom>
-        </p:spPr>
-        <p:style>
-          <a:lnRef idx="2">
-            <a:schemeClr val="accent1">
-              <a:shade val="50000"/>
-            </a:schemeClr>
-          </a:lnRef>
-          <a:fillRef idx="1">
-            <a:schemeClr val="accent1"/>
-          </a:fillRef>
-          <a:effectRef idx="0">
-            <a:schemeClr val="accent1"/>
-          </a:effectRef>
-          <a:fontRef idx="minor">
-            <a:schemeClr val="lt1"/>
-          </a:fontRef>
-        </p:style>
-        <p:txBody>
-          <a:bodyPr rtlCol="0" anchor="ctr"/>
-          <a:lstStyle/>
-          <a:p>
-            <a:pPr algn="ctr"/>
-            <a:r>
-              <a:rPr kumimoji="1" lang="en-US" altLang="ko-Kore-KR" dirty="0" err="1"/>
-              <a:t>LinkedListIterator</a:t>
-            </a:r>
-            <a:endParaRPr kumimoji="1" lang="ko-Kore-KR" altLang="en-US" dirty="0"/>
-          </a:p>
-        </p:txBody>
-      </p:sp>
-      <p:sp>
-        <p:nvSpPr>
-          <p:cNvPr id="8" name="직사각형 7">
-            <a:extLst>
-              <a:ext uri="{FF2B5EF4-FFF2-40B4-BE49-F238E27FC236}">
-                <a16:creationId xmlns:a16="http://schemas.microsoft.com/office/drawing/2014/main" id="{40FFE58C-54FD-E225-41DA-D6A8FEFDFD88}"/>
-              </a:ext>
-            </a:extLst>
-          </p:cNvPr>
-          <p:cNvSpPr/>
-          <p:nvPr/>
-        </p:nvSpPr>
-        <p:spPr>
-          <a:xfrm>
-            <a:off x="3148492" y="3690446"/>
-            <a:ext cx="2140173" cy="677917"/>
-          </a:xfrm>
-          <a:prstGeom prst="rect">
-            <a:avLst/>
-          </a:prstGeom>
-        </p:spPr>
-        <p:style>
-          <a:lnRef idx="2">
-            <a:schemeClr val="accent1">
-              <a:shade val="50000"/>
-            </a:schemeClr>
-          </a:lnRef>
-          <a:fillRef idx="1">
-            <a:schemeClr val="accent1"/>
-          </a:fillRef>
-          <a:effectRef idx="0">
-            <a:schemeClr val="accent1"/>
-          </a:effectRef>
-          <a:fontRef idx="minor">
-            <a:schemeClr val="lt1"/>
-          </a:fontRef>
-        </p:style>
-        <p:txBody>
-          <a:bodyPr rtlCol="0" anchor="ctr"/>
-          <a:lstStyle/>
-          <a:p>
-            <a:pPr algn="ctr"/>
-            <a:r>
-              <a:rPr kumimoji="1" lang="en-US" altLang="ko-Kore-KR" dirty="0" err="1"/>
-              <a:t>StackIterator</a:t>
-            </a:r>
-            <a:endParaRPr kumimoji="1" lang="ko-Kore-KR" altLang="en-US" dirty="0"/>
-          </a:p>
-        </p:txBody>
-      </p:sp>
-      <p:sp>
-        <p:nvSpPr>
-          <p:cNvPr id="9" name="직사각형 8">
-            <a:extLst>
-              <a:ext uri="{FF2B5EF4-FFF2-40B4-BE49-F238E27FC236}">
-                <a16:creationId xmlns:a16="http://schemas.microsoft.com/office/drawing/2014/main" id="{7E4B8974-D4EB-E905-0ED3-2D2DDC9365F0}"/>
-              </a:ext>
-            </a:extLst>
-          </p:cNvPr>
-          <p:cNvSpPr/>
-          <p:nvPr/>
-        </p:nvSpPr>
-        <p:spPr>
-          <a:xfrm>
-            <a:off x="3148492" y="4725715"/>
-            <a:ext cx="2140173" cy="677917"/>
-          </a:xfrm>
-          <a:prstGeom prst="rect">
-            <a:avLst/>
-          </a:prstGeom>
-        </p:spPr>
-        <p:style>
-          <a:lnRef idx="2">
-            <a:schemeClr val="accent1">
-              <a:shade val="50000"/>
-            </a:schemeClr>
-          </a:lnRef>
-          <a:fillRef idx="1">
-            <a:schemeClr val="accent1"/>
-          </a:fillRef>
-          <a:effectRef idx="0">
-            <a:schemeClr val="accent1"/>
-          </a:effectRef>
-          <a:fontRef idx="minor">
-            <a:schemeClr val="lt1"/>
-          </a:fontRef>
-        </p:style>
-        <p:txBody>
-          <a:bodyPr rtlCol="0" anchor="ctr"/>
-          <a:lstStyle/>
-          <a:p>
-            <a:pPr algn="ctr"/>
-            <a:r>
-              <a:rPr kumimoji="1" lang="en-US" altLang="ko-Kore-KR" dirty="0" err="1"/>
-              <a:t>QueueIterator</a:t>
-            </a:r>
-            <a:endParaRPr kumimoji="1" lang="ko-Kore-KR" altLang="en-US" dirty="0"/>
-          </a:p>
-        </p:txBody>
-      </p:sp>
-      <p:sp>
-        <p:nvSpPr>
-          <p:cNvPr id="10" name="직사각형 9">
-            <a:extLst>
-              <a:ext uri="{FF2B5EF4-FFF2-40B4-BE49-F238E27FC236}">
-                <a16:creationId xmlns:a16="http://schemas.microsoft.com/office/drawing/2014/main" id="{071F57C6-F048-0718-D255-C12E543ACF94}"/>
-              </a:ext>
-            </a:extLst>
-          </p:cNvPr>
-          <p:cNvSpPr/>
-          <p:nvPr/>
-        </p:nvSpPr>
-        <p:spPr>
-          <a:xfrm>
-            <a:off x="3148492" y="5806966"/>
-            <a:ext cx="2140173" cy="677917"/>
-          </a:xfrm>
-          <a:prstGeom prst="rect">
-            <a:avLst/>
-          </a:prstGeom>
-        </p:spPr>
-        <p:style>
-          <a:lnRef idx="2">
-            <a:schemeClr val="accent1">
-              <a:shade val="50000"/>
-            </a:schemeClr>
-          </a:lnRef>
-          <a:fillRef idx="1">
-            <a:schemeClr val="accent1"/>
-          </a:fillRef>
-          <a:effectRef idx="0">
-            <a:schemeClr val="accent1"/>
-          </a:effectRef>
-          <a:fontRef idx="minor">
-            <a:schemeClr val="lt1"/>
-          </a:fontRef>
-        </p:style>
-        <p:txBody>
-          <a:bodyPr rtlCol="0" anchor="ctr"/>
-          <a:lstStyle/>
-          <a:p>
-            <a:pPr algn="ctr"/>
-            <a:r>
-              <a:rPr kumimoji="1" lang="en-US" altLang="ko-Kore-KR" dirty="0" err="1"/>
-              <a:t>HashSetIterator</a:t>
-            </a:r>
-            <a:endParaRPr kumimoji="1" lang="ko-Kore-KR" altLang="en-US" dirty="0"/>
-          </a:p>
-        </p:txBody>
-      </p:sp>
-      <p:sp>
-        <p:nvSpPr>
-          <p:cNvPr id="18" name="TextBox 17">
-            <a:extLst>
-              <a:ext uri="{FF2B5EF4-FFF2-40B4-BE49-F238E27FC236}">
-                <a16:creationId xmlns:a16="http://schemas.microsoft.com/office/drawing/2014/main" id="{4F232CB8-A83C-2EFF-9850-CE4F847D5AAA}"/>
-              </a:ext>
-            </a:extLst>
-          </p:cNvPr>
-          <p:cNvSpPr txBox="1"/>
-          <p:nvPr/>
-        </p:nvSpPr>
-        <p:spPr>
-          <a:xfrm>
-            <a:off x="9247136" y="3706238"/>
-            <a:ext cx="1374230" cy="646331"/>
-          </a:xfrm>
-          <a:prstGeom prst="rect">
-            <a:avLst/>
-          </a:prstGeom>
-        </p:spPr>
-        <p:style>
-          <a:lnRef idx="2">
-            <a:schemeClr val="accent5">
-              <a:shade val="50000"/>
-            </a:schemeClr>
-          </a:lnRef>
-          <a:fillRef idx="1">
-            <a:schemeClr val="accent5"/>
-          </a:fillRef>
-          <a:effectRef idx="0">
-            <a:schemeClr val="accent5"/>
-          </a:effectRef>
-          <a:fontRef idx="minor">
-            <a:schemeClr val="lt1"/>
-          </a:fontRef>
-        </p:style>
-        <p:txBody>
-          <a:bodyPr wrap="square" rtlCol="0">
-            <a:spAutoFit/>
-          </a:bodyPr>
-          <a:lstStyle/>
-          <a:p>
-            <a:pPr algn="ctr"/>
-            <a:r>
-              <a:rPr kumimoji="1" lang="en-US" altLang="ko-Kore-KR" dirty="0"/>
-              <a:t>Iterator</a:t>
-            </a:r>
-          </a:p>
-          <a:p>
-            <a:pPr algn="ctr"/>
-            <a:endParaRPr kumimoji="1" lang="ko-Kore-KR" altLang="en-US" dirty="0"/>
-          </a:p>
-        </p:txBody>
-      </p:sp>
-      <p:sp>
-        <p:nvSpPr>
-          <p:cNvPr id="2" name="TextBox 1">
-            <a:extLst>
-              <a:ext uri="{FF2B5EF4-FFF2-40B4-BE49-F238E27FC236}">
-                <a16:creationId xmlns:a16="http://schemas.microsoft.com/office/drawing/2014/main" id="{809E3B69-C23C-595C-ACCC-5B271E69E3E6}"/>
-              </a:ext>
-            </a:extLst>
-          </p:cNvPr>
-          <p:cNvSpPr txBox="1"/>
-          <p:nvPr/>
-        </p:nvSpPr>
-        <p:spPr>
-          <a:xfrm>
-            <a:off x="260127" y="3148428"/>
-            <a:ext cx="1061545" cy="369332"/>
-          </a:xfrm>
-          <a:prstGeom prst="rect">
-            <a:avLst/>
-          </a:prstGeom>
-        </p:spPr>
-        <p:style>
-          <a:lnRef idx="3">
-            <a:schemeClr val="lt1"/>
-          </a:lnRef>
-          <a:fillRef idx="1">
-            <a:schemeClr val="accent4"/>
-          </a:fillRef>
-          <a:effectRef idx="1">
-            <a:schemeClr val="accent4"/>
-          </a:effectRef>
-          <a:fontRef idx="minor">
-            <a:schemeClr val="lt1"/>
-          </a:fontRef>
-        </p:style>
-        <p:txBody>
-          <a:bodyPr wrap="square" rtlCol="0">
-            <a:spAutoFit/>
-          </a:bodyPr>
-          <a:lstStyle/>
-          <a:p>
-            <a:r>
-              <a:rPr kumimoji="1" lang="en-US" altLang="ko-Kore-KR" dirty="0"/>
-              <a:t>Test01</a:t>
-            </a:r>
-            <a:endParaRPr kumimoji="1" lang="ko-Kore-KR" altLang="en-US" dirty="0"/>
-          </a:p>
-        </p:txBody>
-      </p:sp>
-      <p:cxnSp>
-        <p:nvCxnSpPr>
-          <p:cNvPr id="3" name="직선 화살표 연결선 2">
-            <a:extLst>
-              <a:ext uri="{FF2B5EF4-FFF2-40B4-BE49-F238E27FC236}">
-                <a16:creationId xmlns:a16="http://schemas.microsoft.com/office/drawing/2014/main" id="{60DD03A1-886B-E8EC-9891-53E88182A651}"/>
-              </a:ext>
-            </a:extLst>
-          </p:cNvPr>
-          <p:cNvCxnSpPr>
-            <a:cxnSpLocks/>
-            <a:stCxn id="2" idx="3"/>
-            <a:endCxn id="4" idx="1"/>
-          </p:cNvCxnSpPr>
-          <p:nvPr/>
-        </p:nvCxnSpPr>
-        <p:spPr>
-          <a:xfrm flipV="1">
-            <a:off x="1321672" y="1912885"/>
-            <a:ext cx="1826822" cy="1420209"/>
-          </a:xfrm>
-          <a:prstGeom prst="straightConnector1">
-            <a:avLst/>
-          </a:prstGeom>
-          <a:ln>
-            <a:tailEnd type="triangle"/>
-          </a:ln>
-        </p:spPr>
-        <p:style>
-          <a:lnRef idx="3">
-            <a:schemeClr val="accent4"/>
-          </a:lnRef>
-          <a:fillRef idx="0">
-            <a:schemeClr val="accent4"/>
-          </a:fillRef>
-          <a:effectRef idx="2">
-            <a:schemeClr val="accent4"/>
-          </a:effectRef>
-          <a:fontRef idx="minor">
-            <a:schemeClr val="tx1"/>
-          </a:fontRef>
-        </p:style>
-      </p:cxnSp>
-      <p:cxnSp>
-        <p:nvCxnSpPr>
-          <p:cNvPr id="11" name="직선 화살표 연결선 10">
-            <a:extLst>
-              <a:ext uri="{FF2B5EF4-FFF2-40B4-BE49-F238E27FC236}">
-                <a16:creationId xmlns:a16="http://schemas.microsoft.com/office/drawing/2014/main" id="{2B2D4080-FC4C-F72C-90C9-6C762DBB33C6}"/>
-              </a:ext>
-            </a:extLst>
-          </p:cNvPr>
-          <p:cNvCxnSpPr>
-            <a:cxnSpLocks/>
-            <a:stCxn id="2" idx="3"/>
-            <a:endCxn id="7" idx="1"/>
-          </p:cNvCxnSpPr>
-          <p:nvPr/>
-        </p:nvCxnSpPr>
-        <p:spPr>
-          <a:xfrm flipV="1">
-            <a:off x="1321672" y="2948154"/>
-            <a:ext cx="1826821" cy="384940"/>
-          </a:xfrm>
-          <a:prstGeom prst="straightConnector1">
-            <a:avLst/>
-          </a:prstGeom>
-          <a:ln>
-            <a:tailEnd type="triangle"/>
-          </a:ln>
-        </p:spPr>
-        <p:style>
-          <a:lnRef idx="3">
-            <a:schemeClr val="accent4"/>
-          </a:lnRef>
-          <a:fillRef idx="0">
-            <a:schemeClr val="accent4"/>
-          </a:fillRef>
-          <a:effectRef idx="2">
-            <a:schemeClr val="accent4"/>
-          </a:effectRef>
-          <a:fontRef idx="minor">
-            <a:schemeClr val="tx1"/>
-          </a:fontRef>
-        </p:style>
-      </p:cxnSp>
-      <p:cxnSp>
-        <p:nvCxnSpPr>
-          <p:cNvPr id="15" name="직선 화살표 연결선 14">
-            <a:extLst>
-              <a:ext uri="{FF2B5EF4-FFF2-40B4-BE49-F238E27FC236}">
-                <a16:creationId xmlns:a16="http://schemas.microsoft.com/office/drawing/2014/main" id="{4EDF7106-1773-A19B-FA36-08098E87CF24}"/>
-              </a:ext>
-            </a:extLst>
-          </p:cNvPr>
-          <p:cNvCxnSpPr>
-            <a:cxnSpLocks/>
-            <a:stCxn id="2" idx="3"/>
-            <a:endCxn id="8" idx="1"/>
-          </p:cNvCxnSpPr>
-          <p:nvPr/>
-        </p:nvCxnSpPr>
-        <p:spPr>
-          <a:xfrm>
-            <a:off x="1321672" y="3333094"/>
-            <a:ext cx="1826820" cy="696311"/>
-          </a:xfrm>
-          <a:prstGeom prst="straightConnector1">
-            <a:avLst/>
-          </a:prstGeom>
-          <a:ln>
-            <a:tailEnd type="triangle"/>
-          </a:ln>
-        </p:spPr>
-        <p:style>
-          <a:lnRef idx="3">
-            <a:schemeClr val="accent4"/>
-          </a:lnRef>
-          <a:fillRef idx="0">
-            <a:schemeClr val="accent4"/>
-          </a:fillRef>
-          <a:effectRef idx="2">
-            <a:schemeClr val="accent4"/>
-          </a:effectRef>
-          <a:fontRef idx="minor">
-            <a:schemeClr val="tx1"/>
-          </a:fontRef>
-        </p:style>
-      </p:cxnSp>
-      <p:cxnSp>
-        <p:nvCxnSpPr>
-          <p:cNvPr id="20" name="직선 화살표 연결선 19">
-            <a:extLst>
-              <a:ext uri="{FF2B5EF4-FFF2-40B4-BE49-F238E27FC236}">
-                <a16:creationId xmlns:a16="http://schemas.microsoft.com/office/drawing/2014/main" id="{08EB027B-4E4A-49CA-ACE9-6B2F3A9A42CA}"/>
-              </a:ext>
-            </a:extLst>
-          </p:cNvPr>
-          <p:cNvCxnSpPr>
-            <a:cxnSpLocks/>
-            <a:stCxn id="2" idx="3"/>
-            <a:endCxn id="9" idx="1"/>
-          </p:cNvCxnSpPr>
-          <p:nvPr/>
-        </p:nvCxnSpPr>
-        <p:spPr>
-          <a:xfrm>
-            <a:off x="1321672" y="3333094"/>
-            <a:ext cx="1826820" cy="1731580"/>
-          </a:xfrm>
-          <a:prstGeom prst="straightConnector1">
-            <a:avLst/>
-          </a:prstGeom>
-          <a:ln>
-            <a:tailEnd type="triangle"/>
-          </a:ln>
-        </p:spPr>
-        <p:style>
-          <a:lnRef idx="3">
-            <a:schemeClr val="accent4"/>
-          </a:lnRef>
-          <a:fillRef idx="0">
-            <a:schemeClr val="accent4"/>
-          </a:fillRef>
-          <a:effectRef idx="2">
-            <a:schemeClr val="accent4"/>
-          </a:effectRef>
-          <a:fontRef idx="minor">
-            <a:schemeClr val="tx1"/>
-          </a:fontRef>
-        </p:style>
-      </p:cxnSp>
-      <p:cxnSp>
-        <p:nvCxnSpPr>
-          <p:cNvPr id="23" name="직선 화살표 연결선 22">
-            <a:extLst>
-              <a:ext uri="{FF2B5EF4-FFF2-40B4-BE49-F238E27FC236}">
-                <a16:creationId xmlns:a16="http://schemas.microsoft.com/office/drawing/2014/main" id="{27E6CE55-5EA1-4011-C28F-9CD10E6E327B}"/>
-              </a:ext>
-            </a:extLst>
-          </p:cNvPr>
-          <p:cNvCxnSpPr>
-            <a:cxnSpLocks/>
-            <a:stCxn id="2" idx="3"/>
-            <a:endCxn id="10" idx="1"/>
-          </p:cNvCxnSpPr>
-          <p:nvPr/>
-        </p:nvCxnSpPr>
-        <p:spPr>
-          <a:xfrm>
-            <a:off x="1321672" y="3333094"/>
-            <a:ext cx="1826820" cy="2812831"/>
-          </a:xfrm>
-          <a:prstGeom prst="straightConnector1">
-            <a:avLst/>
-          </a:prstGeom>
-          <a:ln>
-            <a:tailEnd type="triangle"/>
-          </a:ln>
-        </p:spPr>
-        <p:style>
-          <a:lnRef idx="3">
-            <a:schemeClr val="accent4"/>
-          </a:lnRef>
-          <a:fillRef idx="0">
-            <a:schemeClr val="accent4"/>
-          </a:fillRef>
-          <a:effectRef idx="2">
-            <a:schemeClr val="accent4"/>
-          </a:effectRef>
-          <a:fontRef idx="minor">
-            <a:schemeClr val="tx1"/>
-          </a:fontRef>
-        </p:style>
-      </p:cxnSp>
-      <p:sp>
-        <p:nvSpPr>
-          <p:cNvPr id="67" name="TextBox 66">
-            <a:extLst>
-              <a:ext uri="{FF2B5EF4-FFF2-40B4-BE49-F238E27FC236}">
-                <a16:creationId xmlns:a16="http://schemas.microsoft.com/office/drawing/2014/main" id="{D207901C-F934-F799-A42D-9DF214C47C2A}"/>
-              </a:ext>
-            </a:extLst>
-          </p:cNvPr>
-          <p:cNvSpPr txBox="1"/>
-          <p:nvPr/>
-        </p:nvSpPr>
-        <p:spPr>
-          <a:xfrm>
-            <a:off x="7306663" y="3844739"/>
-            <a:ext cx="1061545" cy="369332"/>
-          </a:xfrm>
-          <a:prstGeom prst="rect">
-            <a:avLst/>
-          </a:prstGeom>
-        </p:spPr>
-        <p:style>
-          <a:lnRef idx="3">
-            <a:schemeClr val="lt1"/>
-          </a:lnRef>
-          <a:fillRef idx="1">
-            <a:schemeClr val="accent4"/>
-          </a:fillRef>
-          <a:effectRef idx="1">
-            <a:schemeClr val="accent4"/>
-          </a:effectRef>
-          <a:fontRef idx="minor">
-            <a:schemeClr val="lt1"/>
-          </a:fontRef>
-        </p:style>
-        <p:txBody>
-          <a:bodyPr wrap="square" rtlCol="0">
-            <a:spAutoFit/>
-          </a:bodyPr>
-          <a:lstStyle/>
-          <a:p>
-            <a:r>
-              <a:rPr kumimoji="1" lang="en-US" altLang="ko-Kore-KR" dirty="0"/>
-              <a:t>Test01</a:t>
-            </a:r>
-            <a:endParaRPr kumimoji="1" lang="ko-Kore-KR" altLang="en-US" dirty="0"/>
-          </a:p>
-        </p:txBody>
-      </p:sp>
-      <p:cxnSp>
-        <p:nvCxnSpPr>
-          <p:cNvPr id="68" name="직선 화살표 연결선 67">
-            <a:extLst>
-              <a:ext uri="{FF2B5EF4-FFF2-40B4-BE49-F238E27FC236}">
-                <a16:creationId xmlns:a16="http://schemas.microsoft.com/office/drawing/2014/main" id="{44A23A50-A904-414F-50E6-212891E1A805}"/>
-              </a:ext>
-            </a:extLst>
-          </p:cNvPr>
-          <p:cNvCxnSpPr>
-            <a:cxnSpLocks/>
-            <a:stCxn id="67" idx="3"/>
-            <a:endCxn id="18" idx="1"/>
-          </p:cNvCxnSpPr>
-          <p:nvPr/>
-        </p:nvCxnSpPr>
-        <p:spPr>
-          <a:xfrm flipV="1">
-            <a:off x="8368208" y="4029404"/>
-            <a:ext cx="878928" cy="1"/>
-          </a:xfrm>
-          <a:prstGeom prst="straightConnector1">
-            <a:avLst/>
-          </a:prstGeom>
-          <a:ln>
-            <a:tailEnd type="triangle"/>
-          </a:ln>
-        </p:spPr>
-        <p:style>
-          <a:lnRef idx="3">
-            <a:schemeClr val="accent4"/>
-          </a:lnRef>
-          <a:fillRef idx="0">
-            <a:schemeClr val="accent4"/>
-          </a:fillRef>
-          <a:effectRef idx="2">
-            <a:schemeClr val="accent4"/>
-          </a:effectRef>
-          <a:fontRef idx="minor">
-            <a:schemeClr val="tx1"/>
-          </a:fontRef>
-        </p:style>
-      </p:cxnSp>
-      <p:sp>
-        <p:nvSpPr>
-          <p:cNvPr id="73" name="오른쪽 화살표[R] 72">
-            <a:extLst>
-              <a:ext uri="{FF2B5EF4-FFF2-40B4-BE49-F238E27FC236}">
-                <a16:creationId xmlns:a16="http://schemas.microsoft.com/office/drawing/2014/main" id="{8E553B3C-0826-194A-821C-9C30B72232A8}"/>
-              </a:ext>
-            </a:extLst>
-          </p:cNvPr>
-          <p:cNvSpPr/>
-          <p:nvPr/>
-        </p:nvSpPr>
-        <p:spPr>
-          <a:xfrm>
-            <a:off x="5709085" y="3690446"/>
-            <a:ext cx="1177158" cy="677917"/>
-          </a:xfrm>
-          <a:prstGeom prst="rightArrow">
-            <a:avLst/>
-          </a:prstGeom>
-          <a:solidFill>
-            <a:schemeClr val="bg1"/>
-          </a:solidFill>
-        </p:spPr>
-        <p:style>
-          <a:lnRef idx="2">
-            <a:schemeClr val="dk1">
-              <a:shade val="50000"/>
-            </a:schemeClr>
-          </a:lnRef>
-          <a:fillRef idx="1">
-            <a:schemeClr val="dk1"/>
-          </a:fillRef>
-          <a:effectRef idx="0">
-            <a:schemeClr val="dk1"/>
-          </a:effectRef>
-          <a:fontRef idx="minor">
-            <a:schemeClr val="lt1"/>
-          </a:fontRef>
-        </p:style>
-        <p:txBody>
-          <a:bodyPr rtlCol="0" anchor="ctr"/>
-          <a:lstStyle/>
-          <a:p>
-            <a:pPr algn="ctr"/>
-            <a:endParaRPr kumimoji="1" lang="ko-Kore-KR" altLang="en-US"/>
-          </a:p>
-        </p:txBody>
-      </p:sp>
-      <p:sp>
-        <p:nvSpPr>
-          <p:cNvPr id="74" name="직사각형 73">
-            <a:extLst>
-              <a:ext uri="{FF2B5EF4-FFF2-40B4-BE49-F238E27FC236}">
-                <a16:creationId xmlns:a16="http://schemas.microsoft.com/office/drawing/2014/main" id="{D6CF5554-4137-4C9F-4556-DFFC1ED4AFFC}"/>
-              </a:ext>
-            </a:extLst>
-          </p:cNvPr>
-          <p:cNvSpPr/>
-          <p:nvPr/>
-        </p:nvSpPr>
-        <p:spPr>
-          <a:xfrm>
-            <a:off x="3304179" y="95219"/>
-            <a:ext cx="1828801" cy="677917"/>
-          </a:xfrm>
-          <a:prstGeom prst="rect">
-            <a:avLst/>
-          </a:prstGeom>
-        </p:spPr>
-        <p:style>
-          <a:lnRef idx="3">
-            <a:schemeClr val="lt1"/>
-          </a:lnRef>
-          <a:fillRef idx="1">
-            <a:schemeClr val="accent3"/>
-          </a:fillRef>
-          <a:effectRef idx="1">
-            <a:schemeClr val="accent3"/>
-          </a:effectRef>
-          <a:fontRef idx="minor">
-            <a:schemeClr val="lt1"/>
-          </a:fontRef>
-        </p:style>
-        <p:txBody>
-          <a:bodyPr rtlCol="0" anchor="ctr"/>
-          <a:lstStyle/>
-          <a:p>
-            <a:pPr algn="ctr"/>
-            <a:r>
-              <a:rPr kumimoji="1" lang="en-US" altLang="ko-Kore-KR" dirty="0"/>
-              <a:t>&lt;&lt;Interface&gt;&gt;</a:t>
-            </a:r>
-          </a:p>
-          <a:p>
-            <a:pPr algn="ctr"/>
-            <a:r>
-              <a:rPr kumimoji="1" lang="en-US" altLang="ko-Kore-KR" dirty="0"/>
-              <a:t>Iterator</a:t>
-            </a:r>
-            <a:endParaRPr kumimoji="1" lang="ko-Kore-KR" altLang="en-US" dirty="0"/>
-          </a:p>
-        </p:txBody>
-      </p:sp>
-      <p:sp>
-        <p:nvSpPr>
-          <p:cNvPr id="76" name="삼각형 75">
-            <a:extLst>
-              <a:ext uri="{FF2B5EF4-FFF2-40B4-BE49-F238E27FC236}">
-                <a16:creationId xmlns:a16="http://schemas.microsoft.com/office/drawing/2014/main" id="{14C48F61-226C-4A28-4BA5-89259ED02001}"/>
-              </a:ext>
-            </a:extLst>
-          </p:cNvPr>
-          <p:cNvSpPr/>
-          <p:nvPr/>
-        </p:nvSpPr>
-        <p:spPr>
-          <a:xfrm>
-            <a:off x="4097709" y="799502"/>
-            <a:ext cx="241738" cy="208395"/>
-          </a:xfrm>
-          <a:prstGeom prst="triangle">
-            <a:avLst/>
-          </a:prstGeom>
-        </p:spPr>
-        <p:style>
-          <a:lnRef idx="2">
-            <a:schemeClr val="accent3">
-              <a:shade val="50000"/>
-            </a:schemeClr>
-          </a:lnRef>
-          <a:fillRef idx="1">
-            <a:schemeClr val="accent3"/>
-          </a:fillRef>
-          <a:effectRef idx="0">
-            <a:schemeClr val="accent3"/>
-          </a:effectRef>
-          <a:fontRef idx="minor">
-            <a:schemeClr val="lt1"/>
-          </a:fontRef>
-        </p:style>
-        <p:txBody>
-          <a:bodyPr rtlCol="0" anchor="ctr"/>
-          <a:lstStyle/>
-          <a:p>
-            <a:pPr algn="ctr"/>
-            <a:endParaRPr kumimoji="1" lang="ko-Kore-KR" altLang="en-US"/>
+              <a:rPr lang="en" altLang="ko-Kore-KR" dirty="0"/>
+              <a:t>();</a:t>
+            </a:r>
+          </a:p>
+          <a:p>
+            <a:pPr marL="285750" indent="-285750">
+              <a:buFont typeface="Arial" panose="020B0604020202020204" pitchFamily="34" charset="0"/>
+              <a:buChar char="•"/>
+            </a:pPr>
+            <a:r>
+              <a:rPr lang="en" altLang="ko-Kore-KR" dirty="0"/>
+              <a:t>next();</a:t>
+            </a:r>
           </a:p>
         </p:txBody>
       </p:sp>
@@ -6725,7 +4362,7 @@
 </p:sld>
 </file>
 
-<file path=ppt/slides/slide6.xml><?xml version="1.0" encoding="utf-8"?>
+<file path=ppt/slides/slide3.xml><?xml version="1.0" encoding="utf-8"?>
 <p:sld xmlns:a="http://schemas.openxmlformats.org/drawingml/2006/main" xmlns:r="http://schemas.openxmlformats.org/officeDocument/2006/relationships" xmlns:p="http://schemas.openxmlformats.org/presentationml/2006/main">
   <p:cSld>
     <p:spTree>
@@ -7025,12 +4662,8 @@
           <a:lstStyle/>
           <a:p>
             <a:r>
-              <a:rPr kumimoji="1" lang="en-US" altLang="ko-Kore-KR"/>
-              <a:t>load</a:t>
-            </a:r>
-            <a:r>
               <a:rPr kumimoji="1" lang="en-US" altLang="ko-Kore-KR" dirty="0"/>
-              <a:t>()</a:t>
+              <a:t>load()</a:t>
             </a:r>
             <a:endParaRPr kumimoji="1" lang="ko-Kore-KR" altLang="en-US" dirty="0"/>
           </a:p>

</xml_diff>